<commit_message>
feat: modify lecture 2 content
</commit_message>
<xml_diff>
--- a/Lecture 2/VSCode_ch.pptx
+++ b/Lecture 2/VSCode_ch.pptx
@@ -15,11 +15,11 @@
     <p:sldId id="307" r:id="rId6"/>
     <p:sldId id="261" r:id="rId7"/>
     <p:sldId id="302" r:id="rId8"/>
-    <p:sldId id="308" r:id="rId9"/>
-    <p:sldId id="310" r:id="rId10"/>
-    <p:sldId id="309" r:id="rId11"/>
-    <p:sldId id="311" r:id="rId12"/>
-    <p:sldId id="312" r:id="rId13"/>
+    <p:sldId id="310" r:id="rId9"/>
+    <p:sldId id="309" r:id="rId10"/>
+    <p:sldId id="311" r:id="rId11"/>
+    <p:sldId id="312" r:id="rId12"/>
+    <p:sldId id="313" r:id="rId13"/>
     <p:sldId id="260" r:id="rId14"/>
   </p:sldIdLst>
   <p:sldSz cx="12192000" cy="6858000"/>
@@ -235,7 +235,7 @@
           <a:p>
             <a:fld id="{EC69F105-A747-4149-8D18-634112D74862}" type="datetimeFigureOut">
               <a:rPr lang="en-US" smtClean="0"/>
-              <a:t>9/21/2019</a:t>
+              <a:t>9/23/2019</a:t>
             </a:fld>
             <a:endParaRPr lang="en-US"/>
           </a:p>
@@ -7313,7 +7313,7 @@
                 </a:solidFill>
                 <a:cs typeface="Arial" pitchFamily="34" charset="0"/>
               </a:rPr>
-              <a:t>Insert the Sub Title of Your Presentation</a:t>
+              <a:t>Visual Studio Code</a:t>
             </a:r>
             <a:endParaRPr lang="ko-KR" altLang="en-US" sz="1867" dirty="0">
               <a:solidFill>
@@ -11542,621 +11542,6 @@
         </p:nvSpPr>
         <p:spPr>
           <a:xfrm>
-            <a:off x="909865" y="2406672"/>
-            <a:ext cx="4572000" cy="45720"/>
-          </a:xfrm>
-          <a:prstGeom prst="rect">
-            <a:avLst/>
-          </a:prstGeom>
-          <a:solidFill>
-            <a:schemeClr val="accent1"/>
-          </a:solidFill>
-          <a:ln>
-            <a:noFill/>
-          </a:ln>
-        </p:spPr>
-        <p:style>
-          <a:lnRef idx="2">
-            <a:schemeClr val="accent1">
-              <a:shade val="50000"/>
-            </a:schemeClr>
-          </a:lnRef>
-          <a:fillRef idx="1">
-            <a:schemeClr val="accent1"/>
-          </a:fillRef>
-          <a:effectRef idx="0">
-            <a:schemeClr val="accent1"/>
-          </a:effectRef>
-          <a:fontRef idx="minor">
-            <a:schemeClr val="lt1"/>
-          </a:fontRef>
-        </p:style>
-        <p:txBody>
-          <a:bodyPr rot="0" spcFirstLastPara="0" vertOverflow="overflow" horzOverflow="overflow" vert="horz" wrap="square" lIns="91440" tIns="45720" rIns="91440" bIns="45720" numCol="1" spcCol="0" rtlCol="0" fromWordArt="0" anchor="ctr" anchorCtr="0" forceAA="0" compatLnSpc="1">
-            <a:prstTxWarp prst="textNoShape">
-              <a:avLst/>
-            </a:prstTxWarp>
-            <a:noAutofit/>
-          </a:bodyPr>
-          <a:lstStyle/>
-          <a:p>
-            <a:pPr algn="ctr"/>
-            <a:endParaRPr lang="ko-KR" altLang="en-US" sz="2700" dirty="0">
-              <a:latin typeface="メイリオ" panose="020B0604030504040204" pitchFamily="50" charset="-128"/>
-            </a:endParaRPr>
-          </a:p>
-        </p:txBody>
-      </p:sp>
-      <p:sp>
-        <p:nvSpPr>
-          <p:cNvPr id="5" name="Rectangle 4">
-            <a:extLst>
-              <a:ext uri="{FF2B5EF4-FFF2-40B4-BE49-F238E27FC236}">
-                <a16:creationId xmlns:a16="http://schemas.microsoft.com/office/drawing/2014/main" id="{426C4317-3B3B-4C18-993B-9A2B888D8034}"/>
-              </a:ext>
-            </a:extLst>
-          </p:cNvPr>
-          <p:cNvSpPr/>
-          <p:nvPr/>
-        </p:nvSpPr>
-        <p:spPr>
-          <a:xfrm>
-            <a:off x="909865" y="4010277"/>
-            <a:ext cx="4572000" cy="45720"/>
-          </a:xfrm>
-          <a:prstGeom prst="rect">
-            <a:avLst/>
-          </a:prstGeom>
-          <a:solidFill>
-            <a:schemeClr val="accent1"/>
-          </a:solidFill>
-          <a:ln>
-            <a:noFill/>
-          </a:ln>
-        </p:spPr>
-        <p:style>
-          <a:lnRef idx="2">
-            <a:schemeClr val="accent1">
-              <a:shade val="50000"/>
-            </a:schemeClr>
-          </a:lnRef>
-          <a:fillRef idx="1">
-            <a:schemeClr val="accent1"/>
-          </a:fillRef>
-          <a:effectRef idx="0">
-            <a:schemeClr val="accent1"/>
-          </a:effectRef>
-          <a:fontRef idx="minor">
-            <a:schemeClr val="lt1"/>
-          </a:fontRef>
-        </p:style>
-        <p:txBody>
-          <a:bodyPr rot="0" spcFirstLastPara="0" vertOverflow="overflow" horzOverflow="overflow" vert="horz" wrap="square" lIns="91440" tIns="45720" rIns="91440" bIns="45720" numCol="1" spcCol="0" rtlCol="0" fromWordArt="0" anchor="ctr" anchorCtr="0" forceAA="0" compatLnSpc="1">
-            <a:prstTxWarp prst="textNoShape">
-              <a:avLst/>
-            </a:prstTxWarp>
-            <a:noAutofit/>
-          </a:bodyPr>
-          <a:lstStyle/>
-          <a:p>
-            <a:pPr algn="ctr"/>
-            <a:endParaRPr lang="ko-KR" altLang="en-US" sz="2700" dirty="0">
-              <a:latin typeface="メイリオ" panose="020B0604030504040204" pitchFamily="50" charset="-128"/>
-            </a:endParaRPr>
-          </a:p>
-        </p:txBody>
-      </p:sp>
-      <p:grpSp>
-        <p:nvGrpSpPr>
-          <p:cNvPr id="10" name="그룹 7">
-            <a:extLst>
-              <a:ext uri="{FF2B5EF4-FFF2-40B4-BE49-F238E27FC236}">
-                <a16:creationId xmlns:a16="http://schemas.microsoft.com/office/drawing/2014/main" id="{6085EFBB-4ADC-464C-A2B0-67BB777A62E8}"/>
-              </a:ext>
-            </a:extLst>
-          </p:cNvPr>
-          <p:cNvGrpSpPr/>
-          <p:nvPr/>
-        </p:nvGrpSpPr>
-        <p:grpSpPr>
-          <a:xfrm>
-            <a:off x="909865" y="1742887"/>
-            <a:ext cx="5157560" cy="637040"/>
-            <a:chOff x="909865" y="1742886"/>
-            <a:chExt cx="3672408" cy="637040"/>
-          </a:xfrm>
-        </p:grpSpPr>
-        <p:sp>
-          <p:nvSpPr>
-            <p:cNvPr id="11" name="TextBox 10">
-              <a:extLst>
-                <a:ext uri="{FF2B5EF4-FFF2-40B4-BE49-F238E27FC236}">
-                  <a16:creationId xmlns:a16="http://schemas.microsoft.com/office/drawing/2014/main" id="{5A57FCDF-5F84-449D-AEC1-7AFB6CB4FECE}"/>
-                </a:ext>
-              </a:extLst>
-            </p:cNvPr>
-            <p:cNvSpPr txBox="1"/>
-            <p:nvPr/>
-          </p:nvSpPr>
-          <p:spPr>
-            <a:xfrm>
-              <a:off x="909865" y="1742886"/>
-              <a:ext cx="3672408" cy="338554"/>
-            </a:xfrm>
-            <a:prstGeom prst="rect">
-              <a:avLst/>
-            </a:prstGeom>
-            <a:noFill/>
-          </p:spPr>
-          <p:txBody>
-            <a:bodyPr wrap="square" rtlCol="0">
-              <a:spAutoFit/>
-            </a:bodyPr>
-            <a:lstStyle/>
-            <a:p>
-              <a:r>
-                <a:rPr lang="en-US" altLang="ja-JP" sz="1600" b="1" dirty="0">
-                  <a:solidFill>
-                    <a:schemeClr val="accent1"/>
-                  </a:solidFill>
-                  <a:latin typeface="メイリオ" panose="020B0604030504040204" pitchFamily="50" charset="-128"/>
-                  <a:ea typeface="メイリオ" panose="020B0604030504040204" pitchFamily="50" charset="-128"/>
-                  <a:cs typeface="Arial" pitchFamily="34" charset="0"/>
-                </a:rPr>
-                <a:t>Visual Studio Code(</a:t>
-              </a:r>
-              <a:r>
-                <a:rPr lang="zh-TW" altLang="en-US" sz="1600" b="1" dirty="0">
-                  <a:solidFill>
-                    <a:schemeClr val="accent1"/>
-                  </a:solidFill>
-                  <a:latin typeface="メイリオ" panose="020B0604030504040204" pitchFamily="50" charset="-128"/>
-                  <a:ea typeface="メイリオ" panose="020B0604030504040204" pitchFamily="50" charset="-128"/>
-                  <a:cs typeface="Arial" pitchFamily="34" charset="0"/>
-                </a:rPr>
-                <a:t>程式編輯器</a:t>
-              </a:r>
-              <a:r>
-                <a:rPr lang="ja-JP" altLang="en-US" sz="1600" b="1" dirty="0">
-                  <a:solidFill>
-                    <a:schemeClr val="accent1"/>
-                  </a:solidFill>
-                  <a:latin typeface="メイリオ" panose="020B0604030504040204" pitchFamily="50" charset="-128"/>
-                  <a:ea typeface="メイリオ" panose="020B0604030504040204" pitchFamily="50" charset="-128"/>
-                  <a:cs typeface="Arial" pitchFamily="34" charset="0"/>
-                </a:rPr>
-                <a:t>・</a:t>
-              </a:r>
-              <a:r>
-                <a:rPr lang="zh-TW" altLang="en-US" sz="1600" b="1" dirty="0">
-                  <a:solidFill>
-                    <a:schemeClr val="accent1"/>
-                  </a:solidFill>
-                  <a:latin typeface="メイリオ" panose="020B0604030504040204" pitchFamily="50" charset="-128"/>
-                  <a:ea typeface="メイリオ" panose="020B0604030504040204" pitchFamily="50" charset="-128"/>
-                  <a:cs typeface="Arial" pitchFamily="34" charset="0"/>
-                </a:rPr>
-                <a:t>開發環境</a:t>
-              </a:r>
-              <a:r>
-                <a:rPr lang="en-US" altLang="ja-JP" sz="1600" b="1" dirty="0">
-                  <a:solidFill>
-                    <a:schemeClr val="accent1"/>
-                  </a:solidFill>
-                  <a:latin typeface="メイリオ" panose="020B0604030504040204" pitchFamily="50" charset="-128"/>
-                  <a:ea typeface="メイリオ" panose="020B0604030504040204" pitchFamily="50" charset="-128"/>
-                  <a:cs typeface="Arial" pitchFamily="34" charset="0"/>
-                </a:rPr>
-                <a:t>)</a:t>
-              </a:r>
-              <a:r>
-                <a:rPr lang="ja-JP" altLang="en-US" sz="1600" b="1" dirty="0">
-                  <a:solidFill>
-                    <a:schemeClr val="accent1"/>
-                  </a:solidFill>
-                  <a:latin typeface="メイリオ" panose="020B0604030504040204" pitchFamily="50" charset="-128"/>
-                  <a:ea typeface="メイリオ" panose="020B0604030504040204" pitchFamily="50" charset="-128"/>
-                  <a:cs typeface="Arial" pitchFamily="34" charset="0"/>
-                </a:rPr>
-                <a:t> </a:t>
-              </a:r>
-              <a:endParaRPr lang="ko-KR" altLang="en-US" sz="1600" b="1" dirty="0">
-                <a:solidFill>
-                  <a:schemeClr val="accent1"/>
-                </a:solidFill>
-                <a:latin typeface="メイリオ" panose="020B0604030504040204" pitchFamily="50" charset="-128"/>
-                <a:cs typeface="Arial" pitchFamily="34" charset="0"/>
-              </a:endParaRPr>
-            </a:p>
-          </p:txBody>
-        </p:sp>
-        <p:sp>
-          <p:nvSpPr>
-            <p:cNvPr id="12" name="TextBox 11">
-              <a:extLst>
-                <a:ext uri="{FF2B5EF4-FFF2-40B4-BE49-F238E27FC236}">
-                  <a16:creationId xmlns:a16="http://schemas.microsoft.com/office/drawing/2014/main" id="{9CE9C522-E72E-4527-867F-7D938CC3688F}"/>
-                </a:ext>
-              </a:extLst>
-            </p:cNvPr>
-            <p:cNvSpPr txBox="1"/>
-            <p:nvPr/>
-          </p:nvSpPr>
-          <p:spPr>
-            <a:xfrm>
-              <a:off x="909865" y="2102927"/>
-              <a:ext cx="3672408" cy="276999"/>
-            </a:xfrm>
-            <a:prstGeom prst="rect">
-              <a:avLst/>
-            </a:prstGeom>
-            <a:noFill/>
-          </p:spPr>
-          <p:txBody>
-            <a:bodyPr wrap="square" rtlCol="0">
-              <a:spAutoFit/>
-            </a:bodyPr>
-            <a:lstStyle/>
-            <a:p>
-              <a:pPr marL="171450" indent="-171450">
-                <a:buFont typeface="Arial" panose="020B0604020202020204" pitchFamily="34" charset="0"/>
-                <a:buChar char="•"/>
-              </a:pPr>
-              <a:endParaRPr lang="en-US" altLang="ja-JP" sz="1200" dirty="0">
-                <a:solidFill>
-                  <a:schemeClr val="tx1">
-                    <a:lumMod val="75000"/>
-                    <a:lumOff val="25000"/>
-                  </a:schemeClr>
-                </a:solidFill>
-                <a:latin typeface="メイリオ" panose="020B0604030504040204" pitchFamily="50" charset="-128"/>
-                <a:ea typeface="メイリオ" panose="020B0604030504040204" pitchFamily="50" charset="-128"/>
-                <a:cs typeface="Arial" pitchFamily="34" charset="0"/>
-              </a:endParaRPr>
-            </a:p>
-          </p:txBody>
-        </p:sp>
-      </p:grpSp>
-      <p:sp>
-        <p:nvSpPr>
-          <p:cNvPr id="13" name="AutoShape 2" descr="Chrome is a fast, secure, free web browser."/>
-          <p:cNvSpPr>
-            <a:spLocks noChangeAspect="1" noChangeArrowheads="1"/>
-          </p:cNvSpPr>
-          <p:nvPr/>
-        </p:nvSpPr>
-        <p:spPr bwMode="auto">
-          <a:xfrm>
-            <a:off x="155575" y="-144463"/>
-            <a:ext cx="304800" cy="304801"/>
-          </a:xfrm>
-          <a:prstGeom prst="rect">
-            <a:avLst/>
-          </a:prstGeom>
-          <a:noFill/>
-          <a:extLst>
-            <a:ext uri="{909E8E84-426E-40DD-AFC4-6F175D3DCCD1}">
-              <a14:hiddenFill xmlns:a14="http://schemas.microsoft.com/office/drawing/2010/main">
-                <a:solidFill>
-                  <a:srgbClr val="FFFFFF"/>
-                </a:solidFill>
-              </a14:hiddenFill>
-            </a:ext>
-          </a:extLst>
-        </p:spPr>
-        <p:txBody>
-          <a:bodyPr vert="horz" wrap="square" lIns="91440" tIns="45720" rIns="91440" bIns="45720" numCol="1" anchor="t" anchorCtr="0" compatLnSpc="1">
-            <a:prstTxWarp prst="textNoShape">
-              <a:avLst/>
-            </a:prstTxWarp>
-          </a:bodyPr>
-          <a:lstStyle/>
-          <a:p>
-            <a:endParaRPr lang="ja-JP" altLang="en-US">
-              <a:latin typeface="メイリオ" panose="020B0604030504040204" pitchFamily="50" charset="-128"/>
-              <a:ea typeface="メイリオ" panose="020B0604030504040204" pitchFamily="50" charset="-128"/>
-            </a:endParaRPr>
-          </a:p>
-        </p:txBody>
-      </p:sp>
-      <p:pic>
-        <p:nvPicPr>
-          <p:cNvPr id="7" name="図 6"/>
-          <p:cNvPicPr>
-            <a:picLocks noChangeAspect="1"/>
-          </p:cNvPicPr>
-          <p:nvPr/>
-        </p:nvPicPr>
-        <p:blipFill>
-          <a:blip r:embed="rId2" cstate="print">
-            <a:extLst>
-              <a:ext uri="{28A0092B-C50C-407E-A947-70E740481C1C}">
-                <a14:useLocalDpi xmlns:a14="http://schemas.microsoft.com/office/drawing/2010/main" val="0"/>
-              </a:ext>
-            </a:extLst>
-          </a:blip>
-          <a:stretch>
-            <a:fillRect/>
-          </a:stretch>
-        </p:blipFill>
-        <p:spPr>
-          <a:xfrm>
-            <a:off x="9408608" y="169512"/>
-            <a:ext cx="845100" cy="852925"/>
-          </a:xfrm>
-          <a:prstGeom prst="rect">
-            <a:avLst/>
-          </a:prstGeom>
-        </p:spPr>
-      </p:pic>
-      <p:sp>
-        <p:nvSpPr>
-          <p:cNvPr id="17" name="TextBox 11">
-            <a:extLst>
-              <a:ext uri="{FF2B5EF4-FFF2-40B4-BE49-F238E27FC236}">
-                <a16:creationId xmlns:a16="http://schemas.microsoft.com/office/drawing/2014/main" id="{9CE9C522-E72E-4527-867F-7D938CC3688F}"/>
-              </a:ext>
-            </a:extLst>
-          </p:cNvPr>
-          <p:cNvSpPr txBox="1"/>
-          <p:nvPr/>
-        </p:nvSpPr>
-        <p:spPr>
-          <a:xfrm>
-            <a:off x="909865" y="2102928"/>
-            <a:ext cx="5157560" cy="276999"/>
-          </a:xfrm>
-          <a:prstGeom prst="rect">
-            <a:avLst/>
-          </a:prstGeom>
-          <a:noFill/>
-        </p:spPr>
-        <p:txBody>
-          <a:bodyPr wrap="square" rtlCol="0">
-            <a:spAutoFit/>
-          </a:bodyPr>
-          <a:lstStyle/>
-          <a:p>
-            <a:pPr marL="171450" indent="-171450">
-              <a:buFont typeface="Arial" panose="020B0604020202020204" pitchFamily="34" charset="0"/>
-              <a:buChar char="•"/>
-            </a:pPr>
-            <a:r>
-              <a:rPr lang="en-US" altLang="zh-TW" sz="1200" dirty="0">
-                <a:solidFill>
-                  <a:schemeClr val="tx1">
-                    <a:lumMod val="75000"/>
-                    <a:lumOff val="25000"/>
-                  </a:schemeClr>
-                </a:solidFill>
-                <a:latin typeface="メイリオ" panose="020B0604030504040204" pitchFamily="50" charset="-128"/>
-                <a:ea typeface="メイリオ" panose="020B0604030504040204" pitchFamily="50" charset="-128"/>
-                <a:cs typeface="Arial" pitchFamily="34" charset="0"/>
-              </a:rPr>
-              <a:t>Visual Studio Code</a:t>
-            </a:r>
-            <a:r>
-              <a:rPr lang="ja-JP" altLang="en-US" sz="1200" dirty="0">
-                <a:solidFill>
-                  <a:schemeClr val="tx1">
-                    <a:lumMod val="75000"/>
-                    <a:lumOff val="25000"/>
-                  </a:schemeClr>
-                </a:solidFill>
-                <a:latin typeface="メイリオ" panose="020B0604030504040204" pitchFamily="50" charset="-128"/>
-                <a:ea typeface="メイリオ" panose="020B0604030504040204" pitchFamily="50" charset="-128"/>
-                <a:cs typeface="Arial" pitchFamily="34" charset="0"/>
-              </a:rPr>
-              <a:t> </a:t>
-            </a:r>
-            <a:r>
-              <a:rPr lang="en-US" altLang="ja-JP" sz="1200" dirty="0">
-                <a:solidFill>
-                  <a:schemeClr val="tx1">
-                    <a:lumMod val="75000"/>
-                    <a:lumOff val="25000"/>
-                  </a:schemeClr>
-                </a:solidFill>
-                <a:latin typeface="メイリオ" panose="020B0604030504040204" pitchFamily="50" charset="-128"/>
-                <a:ea typeface="メイリオ" panose="020B0604030504040204" pitchFamily="50" charset="-128"/>
-                <a:cs typeface="Arial" pitchFamily="34" charset="0"/>
-              </a:rPr>
-              <a:t>Portable</a:t>
-            </a:r>
-            <a:r>
-              <a:rPr lang="zh-TW" altLang="en-US" sz="1200" dirty="0">
-                <a:solidFill>
-                  <a:schemeClr val="tx1">
-                    <a:lumMod val="75000"/>
-                    <a:lumOff val="25000"/>
-                  </a:schemeClr>
-                </a:solidFill>
-                <a:latin typeface="メイリオ" panose="020B0604030504040204" pitchFamily="50" charset="-128"/>
-                <a:ea typeface="メイリオ" panose="020B0604030504040204" pitchFamily="50" charset="-128"/>
-                <a:cs typeface="Arial" pitchFamily="34" charset="0"/>
-              </a:rPr>
-              <a:t>的使用方法</a:t>
-            </a:r>
-            <a:endParaRPr lang="en-US" altLang="ja-JP" sz="1200" dirty="0">
-              <a:solidFill>
-                <a:schemeClr val="tx1">
-                  <a:lumMod val="75000"/>
-                  <a:lumOff val="25000"/>
-                </a:schemeClr>
-              </a:solidFill>
-              <a:latin typeface="メイリオ" panose="020B0604030504040204" pitchFamily="50" charset="-128"/>
-              <a:ea typeface="メイリオ" panose="020B0604030504040204" pitchFamily="50" charset="-128"/>
-              <a:cs typeface="Arial" pitchFamily="34" charset="0"/>
-            </a:endParaRPr>
-          </a:p>
-        </p:txBody>
-      </p:sp>
-      <p:sp>
-        <p:nvSpPr>
-          <p:cNvPr id="18" name="TextBox 11">
-            <a:extLst>
-              <a:ext uri="{FF2B5EF4-FFF2-40B4-BE49-F238E27FC236}">
-                <a16:creationId xmlns:a16="http://schemas.microsoft.com/office/drawing/2014/main" id="{9CE9C522-E72E-4527-867F-7D938CC3688F}"/>
-              </a:ext>
-            </a:extLst>
-          </p:cNvPr>
-          <p:cNvSpPr txBox="1"/>
-          <p:nvPr/>
-        </p:nvSpPr>
-        <p:spPr>
-          <a:xfrm>
-            <a:off x="909865" y="2544587"/>
-            <a:ext cx="4831908" cy="461665"/>
-          </a:xfrm>
-          <a:prstGeom prst="rect">
-            <a:avLst/>
-          </a:prstGeom>
-          <a:noFill/>
-        </p:spPr>
-        <p:txBody>
-          <a:bodyPr wrap="square" rtlCol="0">
-            <a:spAutoFit/>
-          </a:bodyPr>
-          <a:lstStyle/>
-          <a:p>
-            <a:r>
-              <a:rPr lang="ja-JP" altLang="en-US" sz="1200" dirty="0">
-                <a:solidFill>
-                  <a:schemeClr val="tx1">
-                    <a:lumMod val="75000"/>
-                    <a:lumOff val="25000"/>
-                  </a:schemeClr>
-                </a:solidFill>
-                <a:latin typeface="メイリオ" panose="020B0604030504040204" pitchFamily="50" charset="-128"/>
-                <a:ea typeface="メイリオ" panose="020B0604030504040204" pitchFamily="50" charset="-128"/>
-                <a:cs typeface="Arial" pitchFamily="34" charset="0"/>
-              </a:rPr>
-              <a:t>■ </a:t>
-            </a:r>
-            <a:r>
-              <a:rPr lang="zh-TW" altLang="en-US" sz="1200" dirty="0">
-                <a:solidFill>
-                  <a:schemeClr val="tx1">
-                    <a:lumMod val="75000"/>
-                    <a:lumOff val="25000"/>
-                  </a:schemeClr>
-                </a:solidFill>
-                <a:latin typeface="メイリオ" panose="020B0604030504040204" pitchFamily="50" charset="-128"/>
-                <a:ea typeface="メイリオ" panose="020B0604030504040204" pitchFamily="50" charset="-128"/>
-                <a:cs typeface="Arial" pitchFamily="34" charset="0"/>
-              </a:rPr>
-              <a:t>步驟</a:t>
-            </a:r>
-            <a:endParaRPr lang="en-US" altLang="ja-JP" sz="1200" dirty="0">
-              <a:solidFill>
-                <a:schemeClr val="tx1">
-                  <a:lumMod val="75000"/>
-                  <a:lumOff val="25000"/>
-                </a:schemeClr>
-              </a:solidFill>
-              <a:latin typeface="メイリオ" panose="020B0604030504040204" pitchFamily="50" charset="-128"/>
-              <a:ea typeface="メイリオ" panose="020B0604030504040204" pitchFamily="50" charset="-128"/>
-              <a:cs typeface="Arial" pitchFamily="34" charset="0"/>
-            </a:endParaRPr>
-          </a:p>
-          <a:p>
-            <a:pPr marL="228600" indent="-228600">
-              <a:buFont typeface="+mj-lt"/>
-              <a:buAutoNum type="arabicPeriod"/>
-            </a:pPr>
-            <a:r>
-              <a:rPr lang="en-US" altLang="ja-JP" sz="1200" u="sng">
-                <a:latin typeface="メイリオ" panose="020B0604030504040204" pitchFamily="50" charset="-128"/>
-                <a:ea typeface="メイリオ" panose="020B0604030504040204" pitchFamily="50" charset="-128"/>
-                <a:cs typeface="Arial" pitchFamily="34" charset="0"/>
-              </a:rPr>
-              <a:t> </a:t>
-            </a:r>
-            <a:endParaRPr lang="en-US" altLang="ja-JP" sz="1200" dirty="0">
-              <a:solidFill>
-                <a:schemeClr val="tx1">
-                  <a:lumMod val="75000"/>
-                  <a:lumOff val="25000"/>
-                </a:schemeClr>
-              </a:solidFill>
-              <a:latin typeface="メイリオ" panose="020B0604030504040204" pitchFamily="50" charset="-128"/>
-              <a:ea typeface="メイリオ" panose="020B0604030504040204" pitchFamily="50" charset="-128"/>
-              <a:cs typeface="Arial" pitchFamily="34" charset="0"/>
-            </a:endParaRPr>
-          </a:p>
-        </p:txBody>
-      </p:sp>
-    </p:spTree>
-    <p:extLst>
-      <p:ext uri="{BB962C8B-B14F-4D97-AF65-F5344CB8AC3E}">
-        <p14:creationId xmlns:p14="http://schemas.microsoft.com/office/powerpoint/2010/main" val="3014025577"/>
-      </p:ext>
-    </p:extLst>
-  </p:cSld>
-  <p:clrMapOvr>
-    <a:masterClrMapping/>
-  </p:clrMapOvr>
-</p:sld>
-</file>
-
-<file path=ppt/slides/slide6.xml><?xml version="1.0" encoding="utf-8"?>
-<p:sld xmlns:a="http://schemas.openxmlformats.org/drawingml/2006/main" xmlns:r="http://schemas.openxmlformats.org/officeDocument/2006/relationships" xmlns:p="http://schemas.openxmlformats.org/presentationml/2006/main">
-  <p:cSld>
-    <p:spTree>
-      <p:nvGrpSpPr>
-        <p:cNvPr id="1" name=""/>
-        <p:cNvGrpSpPr/>
-        <p:nvPr/>
-      </p:nvGrpSpPr>
-      <p:grpSpPr>
-        <a:xfrm>
-          <a:off x="0" y="0"/>
-          <a:ext cx="0" cy="0"/>
-          <a:chOff x="0" y="0"/>
-          <a:chExt cx="0" cy="0"/>
-        </a:xfrm>
-      </p:grpSpPr>
-      <p:sp>
-        <p:nvSpPr>
-          <p:cNvPr id="2" name="Text Placeholder 1"/>
-          <p:cNvSpPr>
-            <a:spLocks noGrp="1"/>
-          </p:cNvSpPr>
-          <p:nvPr>
-            <p:ph type="body" sz="quarter" idx="10"/>
-          </p:nvPr>
-        </p:nvSpPr>
-        <p:spPr/>
-        <p:txBody>
-          <a:bodyPr>
-            <a:normAutofit fontScale="85000" lnSpcReduction="20000"/>
-          </a:bodyPr>
-          <a:lstStyle/>
-          <a:p>
-            <a:r>
-              <a:rPr lang="en-US" dirty="0">
-                <a:latin typeface="メイリオ" panose="020B0604030504040204" pitchFamily="50" charset="-128"/>
-                <a:ea typeface="メイリオ" panose="020B0604030504040204" pitchFamily="50" charset="-128"/>
-              </a:rPr>
-              <a:t>Visual Studio Code</a:t>
-            </a:r>
-          </a:p>
-        </p:txBody>
-      </p:sp>
-      <p:sp>
-        <p:nvSpPr>
-          <p:cNvPr id="4" name="Rectangle 3">
-            <a:extLst>
-              <a:ext uri="{FF2B5EF4-FFF2-40B4-BE49-F238E27FC236}">
-                <a16:creationId xmlns:a16="http://schemas.microsoft.com/office/drawing/2014/main" id="{C6E3441B-1888-43A4-AF68-99EB703F7D1B}"/>
-              </a:ext>
-            </a:extLst>
-          </p:cNvPr>
-          <p:cNvSpPr/>
-          <p:nvPr/>
-        </p:nvSpPr>
-        <p:spPr>
-          <a:xfrm>
             <a:off x="909865" y="2406667"/>
             <a:ext cx="4572000" cy="45720"/>
           </a:xfrm>
@@ -13395,7 +12780,7 @@
 </p:sld>
 </file>
 
-<file path=ppt/slides/slide7.xml><?xml version="1.0" encoding="utf-8"?>
+<file path=ppt/slides/slide6.xml><?xml version="1.0" encoding="utf-8"?>
 <p:sld xmlns:a="http://schemas.openxmlformats.org/drawingml/2006/main" xmlns:r="http://schemas.openxmlformats.org/officeDocument/2006/relationships" xmlns:p="http://schemas.openxmlformats.org/presentationml/2006/main">
   <p:cSld>
     <p:spTree>
@@ -14747,7 +14132,7 @@
 </p:sld>
 </file>
 
-<file path=ppt/slides/slide8.xml><?xml version="1.0" encoding="utf-8"?>
+<file path=ppt/slides/slide7.xml><?xml version="1.0" encoding="utf-8"?>
 <p:sld xmlns:a="http://schemas.openxmlformats.org/drawingml/2006/main" xmlns:r="http://schemas.openxmlformats.org/officeDocument/2006/relationships" xmlns:p="http://schemas.openxmlformats.org/presentationml/2006/main">
   <p:cSld>
     <p:spTree>
@@ -16368,7 +15753,7 @@
 </p:sld>
 </file>
 
-<file path=ppt/slides/slide9.xml><?xml version="1.0" encoding="utf-8"?>
+<file path=ppt/slides/slide8.xml><?xml version="1.0" encoding="utf-8"?>
 <p:sld xmlns:a="http://schemas.openxmlformats.org/drawingml/2006/main" xmlns:r="http://schemas.openxmlformats.org/officeDocument/2006/relationships" xmlns:p="http://schemas.openxmlformats.org/presentationml/2006/main">
   <p:cSld>
     <p:spTree>
@@ -17846,6 +17231,2167 @@
     <p:extLst>
       <p:ext uri="{BB962C8B-B14F-4D97-AF65-F5344CB8AC3E}">
         <p14:creationId xmlns:p14="http://schemas.microsoft.com/office/powerpoint/2010/main" val="2875177817"/>
+      </p:ext>
+    </p:extLst>
+  </p:cSld>
+  <p:clrMapOvr>
+    <a:masterClrMapping/>
+  </p:clrMapOvr>
+</p:sld>
+</file>
+
+<file path=ppt/slides/slide9.xml><?xml version="1.0" encoding="utf-8"?>
+<p:sld xmlns:a="http://schemas.openxmlformats.org/drawingml/2006/main" xmlns:r="http://schemas.openxmlformats.org/officeDocument/2006/relationships" xmlns:p="http://schemas.openxmlformats.org/presentationml/2006/main">
+  <p:cSld>
+    <p:spTree>
+      <p:nvGrpSpPr>
+        <p:cNvPr id="1" name=""/>
+        <p:cNvGrpSpPr/>
+        <p:nvPr/>
+      </p:nvGrpSpPr>
+      <p:grpSpPr>
+        <a:xfrm>
+          <a:off x="0" y="0"/>
+          <a:ext cx="0" cy="0"/>
+          <a:chOff x="0" y="0"/>
+          <a:chExt cx="0" cy="0"/>
+        </a:xfrm>
+      </p:grpSpPr>
+      <p:sp>
+        <p:nvSpPr>
+          <p:cNvPr id="4" name="Rectangle 3">
+            <a:extLst>
+              <a:ext uri="{FF2B5EF4-FFF2-40B4-BE49-F238E27FC236}">
+                <a16:creationId xmlns:a16="http://schemas.microsoft.com/office/drawing/2014/main" id="{C6E3441B-1888-43A4-AF68-99EB703F7D1B}"/>
+              </a:ext>
+            </a:extLst>
+          </p:cNvPr>
+          <p:cNvSpPr/>
+          <p:nvPr/>
+        </p:nvSpPr>
+        <p:spPr>
+          <a:xfrm>
+            <a:off x="909865" y="2491862"/>
+            <a:ext cx="4572000" cy="45720"/>
+          </a:xfrm>
+          <a:prstGeom prst="rect">
+            <a:avLst/>
+          </a:prstGeom>
+          <a:solidFill>
+            <a:schemeClr val="accent1"/>
+          </a:solidFill>
+          <a:ln>
+            <a:noFill/>
+          </a:ln>
+        </p:spPr>
+        <p:style>
+          <a:lnRef idx="2">
+            <a:schemeClr val="accent1">
+              <a:shade val="50000"/>
+            </a:schemeClr>
+          </a:lnRef>
+          <a:fillRef idx="1">
+            <a:schemeClr val="accent1"/>
+          </a:fillRef>
+          <a:effectRef idx="0">
+            <a:schemeClr val="accent1"/>
+          </a:effectRef>
+          <a:fontRef idx="minor">
+            <a:schemeClr val="lt1"/>
+          </a:fontRef>
+        </p:style>
+        <p:txBody>
+          <a:bodyPr rot="0" spcFirstLastPara="0" vertOverflow="overflow" horzOverflow="overflow" vert="horz" wrap="square" lIns="91440" tIns="45720" rIns="91440" bIns="45720" numCol="1" spcCol="0" rtlCol="0" fromWordArt="0" anchor="ctr" anchorCtr="0" forceAA="0" compatLnSpc="1">
+            <a:prstTxWarp prst="textNoShape">
+              <a:avLst/>
+            </a:prstTxWarp>
+            <a:noAutofit/>
+          </a:bodyPr>
+          <a:lstStyle/>
+          <a:p>
+            <a:pPr algn="ctr"/>
+            <a:endParaRPr lang="ko-KR" altLang="en-US" sz="2700" dirty="0">
+              <a:latin typeface="メイリオ" panose="020B0604030504040204" pitchFamily="50" charset="-128"/>
+            </a:endParaRPr>
+          </a:p>
+        </p:txBody>
+      </p:sp>
+      <p:grpSp>
+        <p:nvGrpSpPr>
+          <p:cNvPr id="10" name="그룹 7">
+            <a:extLst>
+              <a:ext uri="{FF2B5EF4-FFF2-40B4-BE49-F238E27FC236}">
+                <a16:creationId xmlns:a16="http://schemas.microsoft.com/office/drawing/2014/main" id="{6085EFBB-4ADC-464C-A2B0-67BB777A62E8}"/>
+              </a:ext>
+            </a:extLst>
+          </p:cNvPr>
+          <p:cNvGrpSpPr/>
+          <p:nvPr/>
+        </p:nvGrpSpPr>
+        <p:grpSpPr>
+          <a:xfrm>
+            <a:off x="909865" y="1742887"/>
+            <a:ext cx="5157560" cy="637040"/>
+            <a:chOff x="909865" y="1742886"/>
+            <a:chExt cx="3672408" cy="637040"/>
+          </a:xfrm>
+        </p:grpSpPr>
+        <p:sp>
+          <p:nvSpPr>
+            <p:cNvPr id="11" name="TextBox 10">
+              <a:extLst>
+                <a:ext uri="{FF2B5EF4-FFF2-40B4-BE49-F238E27FC236}">
+                  <a16:creationId xmlns:a16="http://schemas.microsoft.com/office/drawing/2014/main" id="{5A57FCDF-5F84-449D-AEC1-7AFB6CB4FECE}"/>
+                </a:ext>
+              </a:extLst>
+            </p:cNvPr>
+            <p:cNvSpPr txBox="1"/>
+            <p:nvPr/>
+          </p:nvSpPr>
+          <p:spPr>
+            <a:xfrm>
+              <a:off x="909865" y="1742886"/>
+              <a:ext cx="3672408" cy="338554"/>
+            </a:xfrm>
+            <a:prstGeom prst="rect">
+              <a:avLst/>
+            </a:prstGeom>
+            <a:noFill/>
+          </p:spPr>
+          <p:txBody>
+            <a:bodyPr wrap="square" rtlCol="0">
+              <a:spAutoFit/>
+            </a:bodyPr>
+            <a:lstStyle/>
+            <a:p>
+              <a:r>
+                <a:rPr lang="en-US" altLang="ja-JP" sz="1600" b="1" dirty="0">
+                  <a:solidFill>
+                    <a:schemeClr val="accent1"/>
+                  </a:solidFill>
+                  <a:latin typeface="メイリオ" panose="020B0604030504040204" pitchFamily="50" charset="-128"/>
+                  <a:ea typeface="メイリオ" panose="020B0604030504040204" pitchFamily="50" charset="-128"/>
+                  <a:cs typeface="Arial" pitchFamily="34" charset="0"/>
+                </a:rPr>
+                <a:t>Visual Studio Code(</a:t>
+              </a:r>
+              <a:r>
+                <a:rPr lang="zh-TW" altLang="en-US" sz="1600" b="1" dirty="0">
+                  <a:solidFill>
+                    <a:schemeClr val="accent1"/>
+                  </a:solidFill>
+                  <a:latin typeface="メイリオ" panose="020B0604030504040204" pitchFamily="50" charset="-128"/>
+                  <a:ea typeface="メイリオ" panose="020B0604030504040204" pitchFamily="50" charset="-128"/>
+                  <a:cs typeface="Arial" pitchFamily="34" charset="0"/>
+                </a:rPr>
+                <a:t>程式編輯器</a:t>
+              </a:r>
+              <a:r>
+                <a:rPr lang="ja-JP" altLang="en-US" sz="1600" b="1" dirty="0">
+                  <a:solidFill>
+                    <a:schemeClr val="accent1"/>
+                  </a:solidFill>
+                  <a:latin typeface="メイリオ" panose="020B0604030504040204" pitchFamily="50" charset="-128"/>
+                  <a:ea typeface="メイリオ" panose="020B0604030504040204" pitchFamily="50" charset="-128"/>
+                  <a:cs typeface="Arial" pitchFamily="34" charset="0"/>
+                </a:rPr>
+                <a:t>・</a:t>
+              </a:r>
+              <a:r>
+                <a:rPr lang="zh-TW" altLang="en-US" sz="1600" b="1" dirty="0">
+                  <a:solidFill>
+                    <a:schemeClr val="accent1"/>
+                  </a:solidFill>
+                  <a:latin typeface="メイリオ" panose="020B0604030504040204" pitchFamily="50" charset="-128"/>
+                  <a:ea typeface="メイリオ" panose="020B0604030504040204" pitchFamily="50" charset="-128"/>
+                  <a:cs typeface="Arial" pitchFamily="34" charset="0"/>
+                </a:rPr>
+                <a:t>開發環境</a:t>
+              </a:r>
+              <a:r>
+                <a:rPr lang="en-US" altLang="ja-JP" sz="1600" b="1" dirty="0">
+                  <a:solidFill>
+                    <a:schemeClr val="accent1"/>
+                  </a:solidFill>
+                  <a:latin typeface="メイリオ" panose="020B0604030504040204" pitchFamily="50" charset="-128"/>
+                  <a:ea typeface="メイリオ" panose="020B0604030504040204" pitchFamily="50" charset="-128"/>
+                  <a:cs typeface="Arial" pitchFamily="34" charset="0"/>
+                </a:rPr>
+                <a:t>)</a:t>
+              </a:r>
+              <a:r>
+                <a:rPr lang="ja-JP" altLang="en-US" sz="1600" b="1" dirty="0">
+                  <a:solidFill>
+                    <a:schemeClr val="accent1"/>
+                  </a:solidFill>
+                  <a:latin typeface="メイリオ" panose="020B0604030504040204" pitchFamily="50" charset="-128"/>
+                  <a:ea typeface="メイリオ" panose="020B0604030504040204" pitchFamily="50" charset="-128"/>
+                  <a:cs typeface="Arial" pitchFamily="34" charset="0"/>
+                </a:rPr>
+                <a:t> </a:t>
+              </a:r>
+              <a:endParaRPr lang="ko-KR" altLang="en-US" sz="1600" b="1" dirty="0">
+                <a:solidFill>
+                  <a:schemeClr val="accent1"/>
+                </a:solidFill>
+                <a:latin typeface="メイリオ" panose="020B0604030504040204" pitchFamily="50" charset="-128"/>
+                <a:cs typeface="Arial" pitchFamily="34" charset="0"/>
+              </a:endParaRPr>
+            </a:p>
+          </p:txBody>
+        </p:sp>
+        <p:sp>
+          <p:nvSpPr>
+            <p:cNvPr id="12" name="TextBox 11">
+              <a:extLst>
+                <a:ext uri="{FF2B5EF4-FFF2-40B4-BE49-F238E27FC236}">
+                  <a16:creationId xmlns:a16="http://schemas.microsoft.com/office/drawing/2014/main" id="{9CE9C522-E72E-4527-867F-7D938CC3688F}"/>
+                </a:ext>
+              </a:extLst>
+            </p:cNvPr>
+            <p:cNvSpPr txBox="1"/>
+            <p:nvPr/>
+          </p:nvSpPr>
+          <p:spPr>
+            <a:xfrm>
+              <a:off x="909865" y="2102927"/>
+              <a:ext cx="3672408" cy="276999"/>
+            </a:xfrm>
+            <a:prstGeom prst="rect">
+              <a:avLst/>
+            </a:prstGeom>
+            <a:noFill/>
+          </p:spPr>
+          <p:txBody>
+            <a:bodyPr wrap="square" rtlCol="0">
+              <a:spAutoFit/>
+            </a:bodyPr>
+            <a:lstStyle/>
+            <a:p>
+              <a:pPr marL="171450" indent="-171450">
+                <a:buFont typeface="Arial" panose="020B0604020202020204" pitchFamily="34" charset="0"/>
+                <a:buChar char="•"/>
+              </a:pPr>
+              <a:r>
+                <a:rPr lang="zh-TW" altLang="en-US" sz="1200" b="1" dirty="0">
+                  <a:solidFill>
+                    <a:schemeClr val="tx1">
+                      <a:lumMod val="75000"/>
+                      <a:lumOff val="25000"/>
+                    </a:schemeClr>
+                  </a:solidFill>
+                  <a:latin typeface="メイリオ" panose="020B0604030504040204" pitchFamily="50" charset="-128"/>
+                  <a:ea typeface="メイリオ" panose="020B0604030504040204" pitchFamily="50" charset="-128"/>
+                  <a:cs typeface="Arial" pitchFamily="34" charset="0"/>
+                </a:rPr>
+                <a:t>結語</a:t>
+              </a:r>
+              <a:endParaRPr lang="en-US" altLang="ko-KR" sz="1200" dirty="0">
+                <a:solidFill>
+                  <a:schemeClr val="tx1">
+                    <a:lumMod val="75000"/>
+                    <a:lumOff val="25000"/>
+                  </a:schemeClr>
+                </a:solidFill>
+                <a:latin typeface="メイリオ" panose="020B0604030504040204" pitchFamily="50" charset="-128"/>
+                <a:ea typeface="メイリオ" panose="020B0604030504040204" pitchFamily="50" charset="-128"/>
+                <a:cs typeface="Arial" pitchFamily="34" charset="0"/>
+              </a:endParaRPr>
+            </a:p>
+          </p:txBody>
+        </p:sp>
+      </p:grpSp>
+      <p:sp>
+        <p:nvSpPr>
+          <p:cNvPr id="13" name="AutoShape 2" descr="Chrome is a fast, secure, free web browser."/>
+          <p:cNvSpPr>
+            <a:spLocks noChangeAspect="1" noChangeArrowheads="1"/>
+          </p:cNvSpPr>
+          <p:nvPr/>
+        </p:nvSpPr>
+        <p:spPr bwMode="auto">
+          <a:xfrm>
+            <a:off x="155575" y="-144463"/>
+            <a:ext cx="304800" cy="304801"/>
+          </a:xfrm>
+          <a:prstGeom prst="rect">
+            <a:avLst/>
+          </a:prstGeom>
+          <a:noFill/>
+          <a:extLst>
+            <a:ext uri="{909E8E84-426E-40DD-AFC4-6F175D3DCCD1}">
+              <a14:hiddenFill xmlns:a14="http://schemas.microsoft.com/office/drawing/2010/main">
+                <a:solidFill>
+                  <a:srgbClr val="FFFFFF"/>
+                </a:solidFill>
+              </a14:hiddenFill>
+            </a:ext>
+          </a:extLst>
+        </p:spPr>
+        <p:txBody>
+          <a:bodyPr vert="horz" wrap="square" lIns="91440" tIns="45720" rIns="91440" bIns="45720" numCol="1" anchor="t" anchorCtr="0" compatLnSpc="1">
+            <a:prstTxWarp prst="textNoShape">
+              <a:avLst/>
+            </a:prstTxWarp>
+          </a:bodyPr>
+          <a:lstStyle/>
+          <a:p>
+            <a:endParaRPr lang="ja-JP" altLang="en-US">
+              <a:latin typeface="メイリオ" panose="020B0604030504040204" pitchFamily="50" charset="-128"/>
+              <a:ea typeface="メイリオ" panose="020B0604030504040204" pitchFamily="50" charset="-128"/>
+            </a:endParaRPr>
+          </a:p>
+        </p:txBody>
+      </p:sp>
+      <p:sp>
+        <p:nvSpPr>
+          <p:cNvPr id="24" name="TextBox 11">
+            <a:extLst>
+              <a:ext uri="{FF2B5EF4-FFF2-40B4-BE49-F238E27FC236}">
+                <a16:creationId xmlns:a16="http://schemas.microsoft.com/office/drawing/2014/main" id="{9CE9C522-E72E-4527-867F-7D938CC3688F}"/>
+              </a:ext>
+            </a:extLst>
+          </p:cNvPr>
+          <p:cNvSpPr txBox="1"/>
+          <p:nvPr/>
+        </p:nvSpPr>
+        <p:spPr>
+          <a:xfrm>
+            <a:off x="872885" y="2655174"/>
+            <a:ext cx="5083071" cy="1015663"/>
+          </a:xfrm>
+          <a:prstGeom prst="rect">
+            <a:avLst/>
+          </a:prstGeom>
+          <a:noFill/>
+        </p:spPr>
+        <p:txBody>
+          <a:bodyPr wrap="square" rtlCol="0">
+            <a:spAutoFit/>
+          </a:bodyPr>
+          <a:lstStyle/>
+          <a:p>
+            <a:pPr marL="171450" indent="-171450">
+              <a:buFont typeface="Arial" panose="020B0604020202020204" pitchFamily="34" charset="0"/>
+              <a:buChar char="•"/>
+            </a:pPr>
+            <a:r>
+              <a:rPr lang="en-US" altLang="zh-TW" sz="1200" dirty="0">
+                <a:solidFill>
+                  <a:schemeClr val="tx1">
+                    <a:lumMod val="75000"/>
+                    <a:lumOff val="25000"/>
+                  </a:schemeClr>
+                </a:solidFill>
+                <a:latin typeface="メイリオ" panose="020B0604030504040204" pitchFamily="50" charset="-128"/>
+                <a:ea typeface="メイリオ" panose="020B0604030504040204" pitchFamily="50" charset="-128"/>
+                <a:cs typeface="Arial" pitchFamily="34" charset="0"/>
+              </a:rPr>
+              <a:t>Visual Studio Code</a:t>
+            </a:r>
+            <a:r>
+              <a:rPr lang="zh-TW" altLang="en-US" sz="1200" dirty="0">
+                <a:solidFill>
+                  <a:schemeClr val="tx1">
+                    <a:lumMod val="75000"/>
+                    <a:lumOff val="25000"/>
+                  </a:schemeClr>
+                </a:solidFill>
+                <a:latin typeface="メイリオ" panose="020B0604030504040204" pitchFamily="50" charset="-128"/>
+                <a:ea typeface="メイリオ" panose="020B0604030504040204" pitchFamily="50" charset="-128"/>
+                <a:cs typeface="Arial" pitchFamily="34" charset="0"/>
+              </a:rPr>
+              <a:t>的基本使用方法真的不難，其他就交給各位自己摸索了</a:t>
+            </a:r>
+            <a:endParaRPr lang="en-US" altLang="zh-TW" sz="1200" dirty="0">
+              <a:solidFill>
+                <a:schemeClr val="tx1">
+                  <a:lumMod val="75000"/>
+                  <a:lumOff val="25000"/>
+                </a:schemeClr>
+              </a:solidFill>
+              <a:latin typeface="メイリオ" panose="020B0604030504040204" pitchFamily="50" charset="-128"/>
+              <a:ea typeface="メイリオ" panose="020B0604030504040204" pitchFamily="50" charset="-128"/>
+              <a:cs typeface="Arial" pitchFamily="34" charset="0"/>
+            </a:endParaRPr>
+          </a:p>
+          <a:p>
+            <a:pPr marL="171450" indent="-171450">
+              <a:buFont typeface="Arial" panose="020B0604020202020204" pitchFamily="34" charset="0"/>
+              <a:buChar char="•"/>
+            </a:pPr>
+            <a:r>
+              <a:rPr lang="zh-TW" altLang="en-US" sz="1200" dirty="0">
+                <a:solidFill>
+                  <a:schemeClr val="tx1">
+                    <a:lumMod val="75000"/>
+                    <a:lumOff val="25000"/>
+                  </a:schemeClr>
+                </a:solidFill>
+                <a:latin typeface="メイリオ" panose="020B0604030504040204" pitchFamily="50" charset="-128"/>
+                <a:ea typeface="メイリオ" panose="020B0604030504040204" pitchFamily="50" charset="-128"/>
+                <a:cs typeface="Arial" pitchFamily="34" charset="0"/>
+              </a:rPr>
+              <a:t>要增進寫程式效率的話，還有一些非常不錯的方法，如</a:t>
+            </a:r>
+            <a:r>
+              <a:rPr lang="en-US" altLang="zh-TW" sz="1200" dirty="0">
+                <a:solidFill>
+                  <a:schemeClr val="tx1">
+                    <a:lumMod val="75000"/>
+                    <a:lumOff val="25000"/>
+                  </a:schemeClr>
+                </a:solidFill>
+                <a:latin typeface="メイリオ" panose="020B0604030504040204" pitchFamily="50" charset="-128"/>
+                <a:ea typeface="メイリオ" panose="020B0604030504040204" pitchFamily="50" charset="-128"/>
+                <a:cs typeface="Arial" pitchFamily="34" charset="0"/>
+              </a:rPr>
+              <a:t>:</a:t>
+            </a:r>
+          </a:p>
+          <a:p>
+            <a:pPr marL="685744" lvl="1" indent="-228600">
+              <a:buFont typeface="+mj-lt"/>
+              <a:buAutoNum type="arabicPeriod"/>
+            </a:pPr>
+            <a:r>
+              <a:rPr lang="zh-TW" altLang="en-US" sz="1200" dirty="0">
+                <a:solidFill>
+                  <a:schemeClr val="tx1">
+                    <a:lumMod val="75000"/>
+                    <a:lumOff val="25000"/>
+                  </a:schemeClr>
+                </a:solidFill>
+                <a:latin typeface="メイリオ" panose="020B0604030504040204" pitchFamily="50" charset="-128"/>
+                <a:ea typeface="メイリオ" panose="020B0604030504040204" pitchFamily="50" charset="-128"/>
+                <a:cs typeface="Arial" pitchFamily="34" charset="0"/>
+              </a:rPr>
+              <a:t>背</a:t>
+            </a:r>
+            <a:r>
+              <a:rPr lang="ja-JP" altLang="en-US" sz="1200" dirty="0">
+                <a:solidFill>
+                  <a:schemeClr val="tx1">
+                    <a:lumMod val="75000"/>
+                    <a:lumOff val="25000"/>
+                  </a:schemeClr>
+                </a:solidFill>
+                <a:latin typeface="メイリオ" panose="020B0604030504040204" pitchFamily="50" charset="-128"/>
+                <a:ea typeface="メイリオ" panose="020B0604030504040204" pitchFamily="50" charset="-128"/>
+                <a:cs typeface="Arial" pitchFamily="34" charset="0"/>
+              </a:rPr>
+              <a:t>「</a:t>
+            </a:r>
+            <a:r>
+              <a:rPr lang="zh-TW" altLang="en-US" sz="1200" dirty="0">
+                <a:solidFill>
+                  <a:schemeClr val="tx1">
+                    <a:lumMod val="75000"/>
+                    <a:lumOff val="25000"/>
+                  </a:schemeClr>
+                </a:solidFill>
+                <a:latin typeface="メイリオ" panose="020B0604030504040204" pitchFamily="50" charset="-128"/>
+                <a:ea typeface="メイリオ" panose="020B0604030504040204" pitchFamily="50" charset="-128"/>
+                <a:cs typeface="Arial" pitchFamily="34" charset="0"/>
+              </a:rPr>
+              <a:t>快捷鍵</a:t>
+            </a:r>
+            <a:r>
+              <a:rPr lang="en-US" altLang="zh-TW" sz="1200" dirty="0">
+                <a:solidFill>
+                  <a:schemeClr val="tx1">
+                    <a:lumMod val="75000"/>
+                    <a:lumOff val="25000"/>
+                  </a:schemeClr>
+                </a:solidFill>
+                <a:latin typeface="メイリオ" panose="020B0604030504040204" pitchFamily="50" charset="-128"/>
+                <a:ea typeface="メイリオ" panose="020B0604030504040204" pitchFamily="50" charset="-128"/>
+                <a:cs typeface="Arial" pitchFamily="34" charset="0"/>
+              </a:rPr>
+              <a:t>(shortcut keys)</a:t>
+            </a:r>
+            <a:r>
+              <a:rPr lang="ja-JP" altLang="en-US" sz="1200" dirty="0">
+                <a:solidFill>
+                  <a:schemeClr val="tx1">
+                    <a:lumMod val="75000"/>
+                    <a:lumOff val="25000"/>
+                  </a:schemeClr>
+                </a:solidFill>
+                <a:latin typeface="メイリオ" panose="020B0604030504040204" pitchFamily="50" charset="-128"/>
+                <a:ea typeface="メイリオ" panose="020B0604030504040204" pitchFamily="50" charset="-128"/>
+                <a:cs typeface="Arial" pitchFamily="34" charset="0"/>
+              </a:rPr>
+              <a:t>」</a:t>
+            </a:r>
+            <a:endParaRPr lang="en-US" altLang="ja-JP" sz="1200" dirty="0">
+              <a:solidFill>
+                <a:schemeClr val="tx1">
+                  <a:lumMod val="75000"/>
+                  <a:lumOff val="25000"/>
+                </a:schemeClr>
+              </a:solidFill>
+              <a:latin typeface="メイリオ" panose="020B0604030504040204" pitchFamily="50" charset="-128"/>
+              <a:ea typeface="メイリオ" panose="020B0604030504040204" pitchFamily="50" charset="-128"/>
+              <a:cs typeface="Arial" pitchFamily="34" charset="0"/>
+            </a:endParaRPr>
+          </a:p>
+          <a:p>
+            <a:pPr marL="685744" lvl="1" indent="-228600">
+              <a:buFont typeface="+mj-lt"/>
+              <a:buAutoNum type="arabicPeriod"/>
+            </a:pPr>
+            <a:r>
+              <a:rPr lang="zh-TW" altLang="en-US" sz="1200" dirty="0">
+                <a:solidFill>
+                  <a:schemeClr val="tx1">
+                    <a:lumMod val="75000"/>
+                    <a:lumOff val="25000"/>
+                  </a:schemeClr>
+                </a:solidFill>
+                <a:latin typeface="メイリオ" panose="020B0604030504040204" pitchFamily="50" charset="-128"/>
+                <a:ea typeface="メイリオ" panose="020B0604030504040204" pitchFamily="50" charset="-128"/>
+                <a:cs typeface="Arial" pitchFamily="34" charset="0"/>
+              </a:rPr>
+              <a:t>練習</a:t>
+            </a:r>
+            <a:r>
+              <a:rPr lang="ja-JP" altLang="en-US" sz="1200" dirty="0">
+                <a:solidFill>
+                  <a:schemeClr val="tx1">
+                    <a:lumMod val="75000"/>
+                    <a:lumOff val="25000"/>
+                  </a:schemeClr>
+                </a:solidFill>
+                <a:latin typeface="メイリオ" panose="020B0604030504040204" pitchFamily="50" charset="-128"/>
+                <a:ea typeface="メイリオ" panose="020B0604030504040204" pitchFamily="50" charset="-128"/>
+                <a:cs typeface="Arial" pitchFamily="34" charset="0"/>
+              </a:rPr>
+              <a:t>「</a:t>
+            </a:r>
+            <a:r>
+              <a:rPr lang="zh-TW" altLang="en-US" sz="1200" dirty="0">
+                <a:solidFill>
+                  <a:schemeClr val="tx1">
+                    <a:lumMod val="75000"/>
+                    <a:lumOff val="25000"/>
+                  </a:schemeClr>
+                </a:solidFill>
+                <a:latin typeface="メイリオ" panose="020B0604030504040204" pitchFamily="50" charset="-128"/>
+                <a:ea typeface="メイリオ" panose="020B0604030504040204" pitchFamily="50" charset="-128"/>
+                <a:cs typeface="Arial" pitchFamily="34" charset="0"/>
+              </a:rPr>
+              <a:t>英文打字</a:t>
+            </a:r>
+            <a:r>
+              <a:rPr lang="ja-JP" altLang="en-US" sz="1200" dirty="0">
+                <a:solidFill>
+                  <a:schemeClr val="tx1">
+                    <a:lumMod val="75000"/>
+                    <a:lumOff val="25000"/>
+                  </a:schemeClr>
+                </a:solidFill>
+                <a:latin typeface="メイリオ" panose="020B0604030504040204" pitchFamily="50" charset="-128"/>
+                <a:ea typeface="メイリオ" panose="020B0604030504040204" pitchFamily="50" charset="-128"/>
+                <a:cs typeface="Arial" pitchFamily="34" charset="0"/>
+              </a:rPr>
+              <a:t>」</a:t>
+            </a:r>
+            <a:endParaRPr lang="en-US" altLang="ko-KR" sz="1200" dirty="0">
+              <a:solidFill>
+                <a:schemeClr val="tx1">
+                  <a:lumMod val="75000"/>
+                  <a:lumOff val="25000"/>
+                </a:schemeClr>
+              </a:solidFill>
+              <a:latin typeface="メイリオ" panose="020B0604030504040204" pitchFamily="50" charset="-128"/>
+              <a:ea typeface="メイリオ" panose="020B0604030504040204" pitchFamily="50" charset="-128"/>
+              <a:cs typeface="Arial" pitchFamily="34" charset="0"/>
+            </a:endParaRPr>
+          </a:p>
+        </p:txBody>
+      </p:sp>
+      <p:sp>
+        <p:nvSpPr>
+          <p:cNvPr id="14" name="正方形/長方形 13">
+            <a:extLst>
+              <a:ext uri="{FF2B5EF4-FFF2-40B4-BE49-F238E27FC236}">
+                <a16:creationId xmlns:a16="http://schemas.microsoft.com/office/drawing/2014/main" id="{82DEBBDD-0C6E-4959-B003-AFCCD8565259}"/>
+              </a:ext>
+            </a:extLst>
+          </p:cNvPr>
+          <p:cNvSpPr/>
+          <p:nvPr/>
+        </p:nvSpPr>
+        <p:spPr>
+          <a:xfrm>
+            <a:off x="6124577" y="1742887"/>
+            <a:ext cx="4845457" cy="3173062"/>
+          </a:xfrm>
+          <a:prstGeom prst="rect">
+            <a:avLst/>
+          </a:prstGeom>
+          <a:solidFill>
+            <a:schemeClr val="bg1">
+              <a:lumMod val="95000"/>
+            </a:schemeClr>
+          </a:solidFill>
+          <a:ln>
+            <a:solidFill>
+              <a:schemeClr val="tx1">
+                <a:lumMod val="50000"/>
+                <a:lumOff val="50000"/>
+              </a:schemeClr>
+            </a:solidFill>
+          </a:ln>
+        </p:spPr>
+        <p:style>
+          <a:lnRef idx="2">
+            <a:schemeClr val="accent1">
+              <a:shade val="50000"/>
+            </a:schemeClr>
+          </a:lnRef>
+          <a:fillRef idx="1">
+            <a:schemeClr val="accent1"/>
+          </a:fillRef>
+          <a:effectRef idx="0">
+            <a:schemeClr val="accent1"/>
+          </a:effectRef>
+          <a:fontRef idx="minor">
+            <a:schemeClr val="lt1"/>
+          </a:fontRef>
+        </p:style>
+        <p:txBody>
+          <a:bodyPr rtlCol="0" anchor="ctr"/>
+          <a:lstStyle/>
+          <a:p>
+            <a:pPr marL="0" marR="0" lvl="0" indent="0" algn="ctr" defTabSz="914286" rtl="0" eaLnBrk="1" fontAlgn="auto" latinLnBrk="0" hangingPunct="1">
+              <a:lnSpc>
+                <a:spcPct val="100000"/>
+              </a:lnSpc>
+              <a:spcBef>
+                <a:spcPts val="0"/>
+              </a:spcBef>
+              <a:spcAft>
+                <a:spcPts val="0"/>
+              </a:spcAft>
+              <a:buClrTx/>
+              <a:buSzTx/>
+              <a:buFontTx/>
+              <a:buNone/>
+              <a:tabLst/>
+              <a:defRPr/>
+            </a:pPr>
+            <a:endParaRPr kumimoji="1" lang="ja-JP" altLang="en-US" sz="1800" b="0" i="0" u="none" strike="noStrike" kern="1200" cap="none" spc="0" normalizeH="0" baseline="0" noProof="0">
+              <a:ln>
+                <a:noFill/>
+              </a:ln>
+              <a:solidFill>
+                <a:prstClr val="white"/>
+              </a:solidFill>
+              <a:effectLst/>
+              <a:uLnTx/>
+              <a:uFillTx/>
+              <a:latin typeface="Arial"/>
+              <a:cs typeface="+mn-cs"/>
+            </a:endParaRPr>
+          </a:p>
+        </p:txBody>
+      </p:sp>
+      <p:sp>
+        <p:nvSpPr>
+          <p:cNvPr id="15" name="テキスト ボックス 14">
+            <a:extLst>
+              <a:ext uri="{FF2B5EF4-FFF2-40B4-BE49-F238E27FC236}">
+                <a16:creationId xmlns:a16="http://schemas.microsoft.com/office/drawing/2014/main" id="{CDD69E97-6395-4C7F-8AE5-66D766DF930D}"/>
+              </a:ext>
+            </a:extLst>
+          </p:cNvPr>
+          <p:cNvSpPr txBox="1"/>
+          <p:nvPr/>
+        </p:nvSpPr>
+        <p:spPr>
+          <a:xfrm>
+            <a:off x="6217878" y="1883314"/>
+            <a:ext cx="1261884" cy="307777"/>
+          </a:xfrm>
+          <a:prstGeom prst="rect">
+            <a:avLst/>
+          </a:prstGeom>
+          <a:solidFill>
+            <a:schemeClr val="bg2">
+              <a:lumMod val="90000"/>
+            </a:schemeClr>
+          </a:solidFill>
+        </p:spPr>
+        <p:txBody>
+          <a:bodyPr wrap="none" rtlCol="0" anchor="ctr">
+            <a:spAutoFit/>
+          </a:bodyPr>
+          <a:lstStyle/>
+          <a:p>
+            <a:pPr marL="0" marR="0" lvl="0" indent="0" algn="ctr" defTabSz="914286" rtl="0" eaLnBrk="1" fontAlgn="auto" latinLnBrk="0" hangingPunct="1">
+              <a:lnSpc>
+                <a:spcPct val="100000"/>
+              </a:lnSpc>
+              <a:spcBef>
+                <a:spcPts val="0"/>
+              </a:spcBef>
+              <a:spcAft>
+                <a:spcPts val="0"/>
+              </a:spcAft>
+              <a:buClrTx/>
+              <a:buSzTx/>
+              <a:buFontTx/>
+              <a:buNone/>
+              <a:tabLst/>
+              <a:defRPr/>
+            </a:pPr>
+            <a:r>
+              <a:rPr kumimoji="1" lang="zh-TW" altLang="en-US" sz="1400" b="0" i="0" u="none" strike="noStrike" kern="1200" cap="none" spc="0" normalizeH="0" baseline="0" noProof="0" dirty="0">
+                <a:ln>
+                  <a:noFill/>
+                </a:ln>
+                <a:solidFill>
+                  <a:prstClr val="black"/>
+                </a:solidFill>
+                <a:effectLst/>
+                <a:uLnTx/>
+                <a:uFillTx/>
+                <a:latin typeface="メイリオ" panose="020B0604030504040204" pitchFamily="50" charset="-128"/>
+                <a:ea typeface="メイリオ" panose="020B0604030504040204" pitchFamily="50" charset="-128"/>
+                <a:cs typeface="+mn-cs"/>
+              </a:rPr>
+              <a:t>方便的快捷鍵</a:t>
+            </a:r>
+            <a:endParaRPr kumimoji="1" lang="ja-JP" altLang="en-US" sz="1400" b="0" i="0" u="none" strike="noStrike" kern="1200" cap="none" spc="0" normalizeH="0" baseline="0" noProof="0" dirty="0">
+              <a:ln>
+                <a:noFill/>
+              </a:ln>
+              <a:solidFill>
+                <a:prstClr val="black"/>
+              </a:solidFill>
+              <a:effectLst/>
+              <a:uLnTx/>
+              <a:uFillTx/>
+              <a:latin typeface="メイリオ" panose="020B0604030504040204" pitchFamily="50" charset="-128"/>
+              <a:ea typeface="メイリオ" panose="020B0604030504040204" pitchFamily="50" charset="-128"/>
+              <a:cs typeface="+mn-cs"/>
+            </a:endParaRPr>
+          </a:p>
+        </p:txBody>
+      </p:sp>
+      <p:sp>
+        <p:nvSpPr>
+          <p:cNvPr id="16" name="正方形/長方形 15">
+            <a:extLst>
+              <a:ext uri="{FF2B5EF4-FFF2-40B4-BE49-F238E27FC236}">
+                <a16:creationId xmlns:a16="http://schemas.microsoft.com/office/drawing/2014/main" id="{6B49DD23-3D10-4FD4-9CE0-5C83F4315825}"/>
+              </a:ext>
+            </a:extLst>
+          </p:cNvPr>
+          <p:cNvSpPr/>
+          <p:nvPr/>
+        </p:nvSpPr>
+        <p:spPr>
+          <a:xfrm>
+            <a:off x="6217878" y="2243355"/>
+            <a:ext cx="4392487" cy="2862322"/>
+          </a:xfrm>
+          <a:prstGeom prst="rect">
+            <a:avLst/>
+          </a:prstGeom>
+        </p:spPr>
+        <p:txBody>
+          <a:bodyPr wrap="square">
+            <a:spAutoFit/>
+          </a:bodyPr>
+          <a:lstStyle/>
+          <a:p>
+            <a:pPr marL="228600" marR="0" lvl="0" indent="-228600" algn="l" defTabSz="914286" rtl="0" eaLnBrk="1" fontAlgn="auto" latinLnBrk="0" hangingPunct="1">
+              <a:lnSpc>
+                <a:spcPct val="100000"/>
+              </a:lnSpc>
+              <a:spcBef>
+                <a:spcPts val="0"/>
+              </a:spcBef>
+              <a:spcAft>
+                <a:spcPts val="0"/>
+              </a:spcAft>
+              <a:buClrTx/>
+              <a:buSzTx/>
+              <a:buFont typeface="Arial" panose="020B0604020202020204" pitchFamily="34" charset="0"/>
+              <a:buChar char="•"/>
+              <a:tabLst/>
+              <a:defRPr/>
+            </a:pPr>
+            <a:r>
+              <a:rPr kumimoji="0" lang="ja-JP" altLang="en-US" sz="1200" b="0" i="0" u="none" strike="noStrike" kern="1200" cap="none" spc="0" normalizeH="0" baseline="0" noProof="0" dirty="0">
+                <a:ln>
+                  <a:noFill/>
+                </a:ln>
+                <a:solidFill>
+                  <a:prstClr val="black">
+                    <a:lumMod val="75000"/>
+                    <a:lumOff val="25000"/>
+                  </a:prstClr>
+                </a:solidFill>
+                <a:effectLst/>
+                <a:uLnTx/>
+                <a:uFillTx/>
+                <a:latin typeface="メイリオ" panose="020B0604030504040204" pitchFamily="50" charset="-128"/>
+                <a:ea typeface="メイリオ" panose="020B0604030504040204" pitchFamily="50" charset="-128"/>
+                <a:cs typeface="Arial" pitchFamily="34" charset="0"/>
+              </a:rPr>
+              <a:t>「</a:t>
+            </a:r>
+            <a:r>
+              <a:rPr kumimoji="0" lang="en-US" altLang="zh-TW" sz="1200" b="0" i="0" u="none" strike="noStrike" kern="1200" cap="none" spc="0" normalizeH="0" baseline="0" noProof="0" dirty="0">
+                <a:ln>
+                  <a:noFill/>
+                </a:ln>
+                <a:solidFill>
+                  <a:prstClr val="black">
+                    <a:lumMod val="75000"/>
+                    <a:lumOff val="25000"/>
+                  </a:prstClr>
+                </a:solidFill>
+                <a:effectLst/>
+                <a:uLnTx/>
+                <a:uFillTx/>
+                <a:latin typeface="メイリオ" panose="020B0604030504040204" pitchFamily="50" charset="-128"/>
+                <a:ea typeface="メイリオ" panose="020B0604030504040204" pitchFamily="50" charset="-128"/>
+                <a:cs typeface="Arial" pitchFamily="34" charset="0"/>
+              </a:rPr>
+              <a:t>Ctrl + S</a:t>
+            </a:r>
+            <a:r>
+              <a:rPr kumimoji="0" lang="ja-JP" altLang="en-US" sz="1200" b="0" i="0" u="none" strike="noStrike" kern="1200" cap="none" spc="0" normalizeH="0" baseline="0" noProof="0" dirty="0">
+                <a:ln>
+                  <a:noFill/>
+                </a:ln>
+                <a:solidFill>
+                  <a:prstClr val="black">
+                    <a:lumMod val="75000"/>
+                    <a:lumOff val="25000"/>
+                  </a:prstClr>
+                </a:solidFill>
+                <a:effectLst/>
+                <a:uLnTx/>
+                <a:uFillTx/>
+                <a:latin typeface="メイリオ" panose="020B0604030504040204" pitchFamily="50" charset="-128"/>
+                <a:ea typeface="メイリオ" panose="020B0604030504040204" pitchFamily="50" charset="-128"/>
+                <a:cs typeface="Arial" pitchFamily="34" charset="0"/>
+              </a:rPr>
+              <a:t>」：</a:t>
+            </a:r>
+            <a:r>
+              <a:rPr kumimoji="0" lang="zh-TW" altLang="en-US" sz="1200" b="0" i="0" u="none" strike="noStrike" kern="1200" cap="none" spc="0" normalizeH="0" baseline="0" noProof="0" dirty="0">
+                <a:ln>
+                  <a:noFill/>
+                </a:ln>
+                <a:solidFill>
+                  <a:prstClr val="black">
+                    <a:lumMod val="75000"/>
+                    <a:lumOff val="25000"/>
+                  </a:prstClr>
+                </a:solidFill>
+                <a:effectLst/>
+                <a:uLnTx/>
+                <a:uFillTx/>
+                <a:latin typeface="メイリオ" panose="020B0604030504040204" pitchFamily="50" charset="-128"/>
+                <a:ea typeface="メイリオ" panose="020B0604030504040204" pitchFamily="50" charset="-128"/>
+                <a:cs typeface="Arial" pitchFamily="34" charset="0"/>
+              </a:rPr>
+              <a:t>存檔</a:t>
+            </a:r>
+            <a:endParaRPr kumimoji="0" lang="en-US" altLang="zh-TW" sz="1200" b="0" i="0" u="none" strike="noStrike" kern="1200" cap="none" spc="0" normalizeH="0" baseline="0" noProof="0" dirty="0">
+              <a:ln>
+                <a:noFill/>
+              </a:ln>
+              <a:solidFill>
+                <a:prstClr val="black">
+                  <a:lumMod val="75000"/>
+                  <a:lumOff val="25000"/>
+                </a:prstClr>
+              </a:solidFill>
+              <a:effectLst/>
+              <a:uLnTx/>
+              <a:uFillTx/>
+              <a:latin typeface="メイリオ" panose="020B0604030504040204" pitchFamily="50" charset="-128"/>
+              <a:ea typeface="メイリオ" panose="020B0604030504040204" pitchFamily="50" charset="-128"/>
+              <a:cs typeface="Arial" pitchFamily="34" charset="0"/>
+            </a:endParaRPr>
+          </a:p>
+          <a:p>
+            <a:pPr marL="228600" lvl="0" indent="-228600">
+              <a:buFont typeface="Arial" panose="020B0604020202020204" pitchFamily="34" charset="0"/>
+              <a:buChar char="•"/>
+              <a:defRPr/>
+            </a:pPr>
+            <a:r>
+              <a:rPr lang="ja-JP" altLang="en-US" sz="1200" dirty="0">
+                <a:solidFill>
+                  <a:prstClr val="black">
+                    <a:lumMod val="75000"/>
+                    <a:lumOff val="25000"/>
+                  </a:prstClr>
+                </a:solidFill>
+                <a:latin typeface="メイリオ" panose="020B0604030504040204" pitchFamily="50" charset="-128"/>
+                <a:ea typeface="メイリオ" panose="020B0604030504040204" pitchFamily="50" charset="-128"/>
+                <a:cs typeface="Arial" pitchFamily="34" charset="0"/>
+              </a:rPr>
+              <a:t>「</a:t>
+            </a:r>
+            <a:r>
+              <a:rPr lang="en-US" altLang="zh-TW" sz="1200" dirty="0">
+                <a:solidFill>
+                  <a:prstClr val="black">
+                    <a:lumMod val="75000"/>
+                    <a:lumOff val="25000"/>
+                  </a:prstClr>
+                </a:solidFill>
+                <a:latin typeface="メイリオ" panose="020B0604030504040204" pitchFamily="50" charset="-128"/>
+                <a:ea typeface="メイリオ" panose="020B0604030504040204" pitchFamily="50" charset="-128"/>
+                <a:cs typeface="Arial" pitchFamily="34" charset="0"/>
+              </a:rPr>
+              <a:t>Ctrl + C</a:t>
+            </a:r>
+            <a:r>
+              <a:rPr lang="ja-JP" altLang="en-US" sz="1200" dirty="0">
+                <a:solidFill>
+                  <a:prstClr val="black">
+                    <a:lumMod val="75000"/>
+                    <a:lumOff val="25000"/>
+                  </a:prstClr>
+                </a:solidFill>
+                <a:latin typeface="メイリオ" panose="020B0604030504040204" pitchFamily="50" charset="-128"/>
+                <a:ea typeface="メイリオ" panose="020B0604030504040204" pitchFamily="50" charset="-128"/>
+                <a:cs typeface="Arial" pitchFamily="34" charset="0"/>
+              </a:rPr>
+              <a:t>」：</a:t>
+            </a:r>
+            <a:r>
+              <a:rPr lang="zh-TW" altLang="en-US" sz="1200" dirty="0">
+                <a:solidFill>
+                  <a:prstClr val="black">
+                    <a:lumMod val="75000"/>
+                    <a:lumOff val="25000"/>
+                  </a:prstClr>
+                </a:solidFill>
+                <a:latin typeface="メイリオ" panose="020B0604030504040204" pitchFamily="50" charset="-128"/>
+                <a:ea typeface="メイリオ" panose="020B0604030504040204" pitchFamily="50" charset="-128"/>
+                <a:cs typeface="Arial" pitchFamily="34" charset="0"/>
+              </a:rPr>
+              <a:t>複製</a:t>
+            </a:r>
+            <a:endParaRPr lang="en-US" altLang="zh-TW" sz="1200" dirty="0">
+              <a:solidFill>
+                <a:prstClr val="black">
+                  <a:lumMod val="75000"/>
+                  <a:lumOff val="25000"/>
+                </a:prstClr>
+              </a:solidFill>
+              <a:latin typeface="メイリオ" panose="020B0604030504040204" pitchFamily="50" charset="-128"/>
+              <a:ea typeface="メイリオ" panose="020B0604030504040204" pitchFamily="50" charset="-128"/>
+              <a:cs typeface="Arial" pitchFamily="34" charset="0"/>
+            </a:endParaRPr>
+          </a:p>
+          <a:p>
+            <a:pPr marL="228600" indent="-228600">
+              <a:buFont typeface="Arial" panose="020B0604020202020204" pitchFamily="34" charset="0"/>
+              <a:buChar char="•"/>
+              <a:defRPr/>
+            </a:pPr>
+            <a:r>
+              <a:rPr lang="ja-JP" altLang="en-US" sz="1200" dirty="0">
+                <a:solidFill>
+                  <a:prstClr val="black">
+                    <a:lumMod val="75000"/>
+                    <a:lumOff val="25000"/>
+                  </a:prstClr>
+                </a:solidFill>
+                <a:latin typeface="メイリオ" panose="020B0604030504040204" pitchFamily="50" charset="-128"/>
+                <a:ea typeface="メイリオ" panose="020B0604030504040204" pitchFamily="50" charset="-128"/>
+                <a:cs typeface="Arial" pitchFamily="34" charset="0"/>
+              </a:rPr>
+              <a:t>「</a:t>
+            </a:r>
+            <a:r>
+              <a:rPr lang="en-US" altLang="zh-TW" sz="1200" dirty="0">
+                <a:solidFill>
+                  <a:prstClr val="black">
+                    <a:lumMod val="75000"/>
+                    <a:lumOff val="25000"/>
+                  </a:prstClr>
+                </a:solidFill>
+                <a:latin typeface="メイリオ" panose="020B0604030504040204" pitchFamily="50" charset="-128"/>
+                <a:ea typeface="メイリオ" panose="020B0604030504040204" pitchFamily="50" charset="-128"/>
+                <a:cs typeface="Arial" pitchFamily="34" charset="0"/>
+              </a:rPr>
+              <a:t>Ctrl + X</a:t>
+            </a:r>
+            <a:r>
+              <a:rPr lang="ja-JP" altLang="en-US" sz="1200" dirty="0">
+                <a:solidFill>
+                  <a:prstClr val="black">
+                    <a:lumMod val="75000"/>
+                    <a:lumOff val="25000"/>
+                  </a:prstClr>
+                </a:solidFill>
+                <a:latin typeface="メイリオ" panose="020B0604030504040204" pitchFamily="50" charset="-128"/>
+                <a:ea typeface="メイリオ" panose="020B0604030504040204" pitchFamily="50" charset="-128"/>
+                <a:cs typeface="Arial" pitchFamily="34" charset="0"/>
+              </a:rPr>
+              <a:t>」：</a:t>
+            </a:r>
+            <a:r>
+              <a:rPr lang="zh-TW" altLang="en-US" sz="1200" dirty="0">
+                <a:solidFill>
+                  <a:prstClr val="black">
+                    <a:lumMod val="75000"/>
+                    <a:lumOff val="25000"/>
+                  </a:prstClr>
+                </a:solidFill>
+                <a:latin typeface="メイリオ" panose="020B0604030504040204" pitchFamily="50" charset="-128"/>
+                <a:ea typeface="メイリオ" panose="020B0604030504040204" pitchFamily="50" charset="-128"/>
+                <a:cs typeface="Arial" pitchFamily="34" charset="0"/>
+              </a:rPr>
+              <a:t>剪下</a:t>
+            </a:r>
+            <a:endParaRPr lang="en-US" altLang="zh-TW" sz="1200" dirty="0">
+              <a:solidFill>
+                <a:prstClr val="black">
+                  <a:lumMod val="75000"/>
+                  <a:lumOff val="25000"/>
+                </a:prstClr>
+              </a:solidFill>
+              <a:latin typeface="メイリオ" panose="020B0604030504040204" pitchFamily="50" charset="-128"/>
+              <a:ea typeface="メイリオ" panose="020B0604030504040204" pitchFamily="50" charset="-128"/>
+              <a:cs typeface="Arial" pitchFamily="34" charset="0"/>
+            </a:endParaRPr>
+          </a:p>
+          <a:p>
+            <a:pPr marL="228600" indent="-228600">
+              <a:buFont typeface="Arial" panose="020B0604020202020204" pitchFamily="34" charset="0"/>
+              <a:buChar char="•"/>
+              <a:defRPr/>
+            </a:pPr>
+            <a:r>
+              <a:rPr lang="ja-JP" altLang="en-US" sz="1200" dirty="0">
+                <a:solidFill>
+                  <a:prstClr val="black">
+                    <a:lumMod val="75000"/>
+                    <a:lumOff val="25000"/>
+                  </a:prstClr>
+                </a:solidFill>
+                <a:latin typeface="メイリオ" panose="020B0604030504040204" pitchFamily="50" charset="-128"/>
+                <a:ea typeface="メイリオ" panose="020B0604030504040204" pitchFamily="50" charset="-128"/>
+                <a:cs typeface="Arial" pitchFamily="34" charset="0"/>
+              </a:rPr>
+              <a:t>「</a:t>
+            </a:r>
+            <a:r>
+              <a:rPr lang="en-US" altLang="zh-TW" sz="1200" dirty="0">
+                <a:solidFill>
+                  <a:prstClr val="black">
+                    <a:lumMod val="75000"/>
+                    <a:lumOff val="25000"/>
+                  </a:prstClr>
+                </a:solidFill>
+                <a:latin typeface="メイリオ" panose="020B0604030504040204" pitchFamily="50" charset="-128"/>
+                <a:ea typeface="メイリオ" panose="020B0604030504040204" pitchFamily="50" charset="-128"/>
+                <a:cs typeface="Arial" pitchFamily="34" charset="0"/>
+              </a:rPr>
+              <a:t>Ctrl + V</a:t>
+            </a:r>
+            <a:r>
+              <a:rPr lang="ja-JP" altLang="en-US" sz="1200" dirty="0">
+                <a:solidFill>
+                  <a:prstClr val="black">
+                    <a:lumMod val="75000"/>
+                    <a:lumOff val="25000"/>
+                  </a:prstClr>
+                </a:solidFill>
+                <a:latin typeface="メイリオ" panose="020B0604030504040204" pitchFamily="50" charset="-128"/>
+                <a:ea typeface="メイリオ" panose="020B0604030504040204" pitchFamily="50" charset="-128"/>
+                <a:cs typeface="Arial" pitchFamily="34" charset="0"/>
+              </a:rPr>
+              <a:t>」：</a:t>
+            </a:r>
+            <a:r>
+              <a:rPr lang="zh-TW" altLang="en-US" sz="1200" dirty="0">
+                <a:solidFill>
+                  <a:prstClr val="black">
+                    <a:lumMod val="75000"/>
+                    <a:lumOff val="25000"/>
+                  </a:prstClr>
+                </a:solidFill>
+                <a:latin typeface="メイリオ" panose="020B0604030504040204" pitchFamily="50" charset="-128"/>
+                <a:ea typeface="メイリオ" panose="020B0604030504040204" pitchFamily="50" charset="-128"/>
+                <a:cs typeface="Arial" pitchFamily="34" charset="0"/>
+              </a:rPr>
+              <a:t>貼上</a:t>
+            </a:r>
+            <a:endParaRPr lang="en-US" altLang="zh-TW" sz="1200" dirty="0">
+              <a:solidFill>
+                <a:prstClr val="black">
+                  <a:lumMod val="75000"/>
+                  <a:lumOff val="25000"/>
+                </a:prstClr>
+              </a:solidFill>
+              <a:latin typeface="メイリオ" panose="020B0604030504040204" pitchFamily="50" charset="-128"/>
+              <a:ea typeface="メイリオ" panose="020B0604030504040204" pitchFamily="50" charset="-128"/>
+              <a:cs typeface="Arial" pitchFamily="34" charset="0"/>
+            </a:endParaRPr>
+          </a:p>
+          <a:p>
+            <a:pPr marL="228600" indent="-228600">
+              <a:buFont typeface="Arial" panose="020B0604020202020204" pitchFamily="34" charset="0"/>
+              <a:buChar char="•"/>
+              <a:defRPr/>
+            </a:pPr>
+            <a:r>
+              <a:rPr lang="ja-JP" altLang="en-US" sz="1200" dirty="0">
+                <a:solidFill>
+                  <a:prstClr val="black">
+                    <a:lumMod val="75000"/>
+                    <a:lumOff val="25000"/>
+                  </a:prstClr>
+                </a:solidFill>
+                <a:latin typeface="メイリオ" panose="020B0604030504040204" pitchFamily="50" charset="-128"/>
+                <a:ea typeface="メイリオ" panose="020B0604030504040204" pitchFamily="50" charset="-128"/>
+                <a:cs typeface="Arial" pitchFamily="34" charset="0"/>
+              </a:rPr>
+              <a:t>「</a:t>
+            </a:r>
+            <a:r>
+              <a:rPr lang="en-US" altLang="ja-JP" sz="1200" dirty="0">
+                <a:solidFill>
+                  <a:prstClr val="black">
+                    <a:lumMod val="75000"/>
+                    <a:lumOff val="25000"/>
+                  </a:prstClr>
+                </a:solidFill>
+                <a:latin typeface="メイリオ" panose="020B0604030504040204" pitchFamily="50" charset="-128"/>
+                <a:ea typeface="メイリオ" panose="020B0604030504040204" pitchFamily="50" charset="-128"/>
+                <a:cs typeface="Arial" pitchFamily="34" charset="0"/>
+              </a:rPr>
+              <a:t>Ctrl + Z</a:t>
+            </a:r>
+            <a:r>
+              <a:rPr lang="ja-JP" altLang="en-US" sz="1200" dirty="0">
+                <a:solidFill>
+                  <a:prstClr val="black">
+                    <a:lumMod val="75000"/>
+                    <a:lumOff val="25000"/>
+                  </a:prstClr>
+                </a:solidFill>
+                <a:latin typeface="メイリオ" panose="020B0604030504040204" pitchFamily="50" charset="-128"/>
+                <a:ea typeface="メイリオ" panose="020B0604030504040204" pitchFamily="50" charset="-128"/>
+                <a:cs typeface="Arial" pitchFamily="34" charset="0"/>
+              </a:rPr>
+              <a:t>」：</a:t>
+            </a:r>
+            <a:r>
+              <a:rPr lang="zh-TW" altLang="en-US" sz="1200" dirty="0">
+                <a:solidFill>
+                  <a:prstClr val="black">
+                    <a:lumMod val="75000"/>
+                    <a:lumOff val="25000"/>
+                  </a:prstClr>
+                </a:solidFill>
+                <a:latin typeface="メイリオ" panose="020B0604030504040204" pitchFamily="50" charset="-128"/>
+                <a:ea typeface="メイリオ" panose="020B0604030504040204" pitchFamily="50" charset="-128"/>
+                <a:cs typeface="Arial" pitchFamily="34" charset="0"/>
+              </a:rPr>
+              <a:t>回上一步</a:t>
+            </a:r>
+            <a:endParaRPr lang="en-US" altLang="zh-TW" sz="1200" dirty="0">
+              <a:solidFill>
+                <a:prstClr val="black">
+                  <a:lumMod val="75000"/>
+                  <a:lumOff val="25000"/>
+                </a:prstClr>
+              </a:solidFill>
+              <a:latin typeface="メイリオ" panose="020B0604030504040204" pitchFamily="50" charset="-128"/>
+              <a:ea typeface="メイリオ" panose="020B0604030504040204" pitchFamily="50" charset="-128"/>
+              <a:cs typeface="Arial" pitchFamily="34" charset="0"/>
+            </a:endParaRPr>
+          </a:p>
+          <a:p>
+            <a:pPr marL="228600" indent="-228600">
+              <a:buFont typeface="Arial" panose="020B0604020202020204" pitchFamily="34" charset="0"/>
+              <a:buChar char="•"/>
+              <a:defRPr/>
+            </a:pPr>
+            <a:r>
+              <a:rPr lang="ja-JP" altLang="en-US" sz="1200" dirty="0">
+                <a:solidFill>
+                  <a:prstClr val="black">
+                    <a:lumMod val="75000"/>
+                    <a:lumOff val="25000"/>
+                  </a:prstClr>
+                </a:solidFill>
+                <a:latin typeface="メイリオ" panose="020B0604030504040204" pitchFamily="50" charset="-128"/>
+                <a:ea typeface="メイリオ" panose="020B0604030504040204" pitchFamily="50" charset="-128"/>
+                <a:cs typeface="Arial" pitchFamily="34" charset="0"/>
+              </a:rPr>
+              <a:t>「</a:t>
+            </a:r>
+            <a:r>
+              <a:rPr lang="en-US" altLang="ja-JP" sz="1200" dirty="0">
+                <a:solidFill>
+                  <a:prstClr val="black">
+                    <a:lumMod val="75000"/>
+                    <a:lumOff val="25000"/>
+                  </a:prstClr>
+                </a:solidFill>
+                <a:latin typeface="メイリオ" panose="020B0604030504040204" pitchFamily="50" charset="-128"/>
+                <a:ea typeface="メイリオ" panose="020B0604030504040204" pitchFamily="50" charset="-128"/>
+                <a:cs typeface="Arial" pitchFamily="34" charset="0"/>
+              </a:rPr>
+              <a:t>Alt + Tab</a:t>
+            </a:r>
+            <a:r>
+              <a:rPr lang="ja-JP" altLang="en-US" sz="1200" dirty="0">
+                <a:solidFill>
+                  <a:prstClr val="black">
+                    <a:lumMod val="75000"/>
+                    <a:lumOff val="25000"/>
+                  </a:prstClr>
+                </a:solidFill>
+                <a:latin typeface="メイリオ" panose="020B0604030504040204" pitchFamily="50" charset="-128"/>
+                <a:ea typeface="メイリオ" panose="020B0604030504040204" pitchFamily="50" charset="-128"/>
+                <a:cs typeface="Arial" pitchFamily="34" charset="0"/>
+              </a:rPr>
+              <a:t>」：</a:t>
+            </a:r>
+            <a:r>
+              <a:rPr lang="zh-TW" altLang="en-US" sz="1200" dirty="0">
+                <a:solidFill>
+                  <a:prstClr val="black">
+                    <a:lumMod val="75000"/>
+                    <a:lumOff val="25000"/>
+                  </a:prstClr>
+                </a:solidFill>
+                <a:latin typeface="メイリオ" panose="020B0604030504040204" pitchFamily="50" charset="-128"/>
+                <a:ea typeface="メイリオ" panose="020B0604030504040204" pitchFamily="50" charset="-128"/>
+                <a:cs typeface="Arial" pitchFamily="34" charset="0"/>
+              </a:rPr>
+              <a:t>切換正在使用的程式</a:t>
+            </a:r>
+            <a:endParaRPr lang="en-US" altLang="zh-TW" sz="1200" dirty="0">
+              <a:solidFill>
+                <a:prstClr val="black">
+                  <a:lumMod val="75000"/>
+                  <a:lumOff val="25000"/>
+                </a:prstClr>
+              </a:solidFill>
+              <a:latin typeface="メイリオ" panose="020B0604030504040204" pitchFamily="50" charset="-128"/>
+              <a:ea typeface="メイリオ" panose="020B0604030504040204" pitchFamily="50" charset="-128"/>
+              <a:cs typeface="Arial" pitchFamily="34" charset="0"/>
+            </a:endParaRPr>
+          </a:p>
+          <a:p>
+            <a:pPr marL="228600" indent="-228600">
+              <a:buFont typeface="Arial" panose="020B0604020202020204" pitchFamily="34" charset="0"/>
+              <a:buChar char="•"/>
+              <a:defRPr/>
+            </a:pPr>
+            <a:r>
+              <a:rPr lang="ja-JP" altLang="en-US" sz="1200" dirty="0">
+                <a:solidFill>
+                  <a:prstClr val="black">
+                    <a:lumMod val="75000"/>
+                    <a:lumOff val="25000"/>
+                  </a:prstClr>
+                </a:solidFill>
+                <a:latin typeface="メイリオ" panose="020B0604030504040204" pitchFamily="50" charset="-128"/>
+                <a:ea typeface="メイリオ" panose="020B0604030504040204" pitchFamily="50" charset="-128"/>
+                <a:cs typeface="Arial" pitchFamily="34" charset="0"/>
+              </a:rPr>
+              <a:t>「</a:t>
+            </a:r>
+            <a:r>
+              <a:rPr lang="ja-JP" altLang="en-US" sz="1200" dirty="0">
+                <a:solidFill>
+                  <a:prstClr val="black">
+                    <a:lumMod val="75000"/>
+                    <a:lumOff val="25000"/>
+                  </a:prstClr>
+                </a:solidFill>
+                <a:latin typeface="メイリオ" panose="020B0604030504040204" pitchFamily="50" charset="-128"/>
+                <a:ea typeface="メイリオ" panose="020B0604030504040204" pitchFamily="50" charset="-128"/>
+                <a:cs typeface="Arial" pitchFamily="34" charset="0"/>
+                <a:sym typeface="Marlett" pitchFamily="2" charset="2"/>
+              </a:rPr>
+              <a:t> </a:t>
+            </a:r>
+            <a:r>
+              <a:rPr lang="en-US" altLang="ja-JP" sz="1200" dirty="0">
+                <a:solidFill>
+                  <a:prstClr val="black">
+                    <a:lumMod val="75000"/>
+                    <a:lumOff val="25000"/>
+                  </a:prstClr>
+                </a:solidFill>
+                <a:latin typeface="メイリオ" panose="020B0604030504040204" pitchFamily="50" charset="-128"/>
+                <a:ea typeface="メイリオ" panose="020B0604030504040204" pitchFamily="50" charset="-128"/>
+                <a:cs typeface="Arial" pitchFamily="34" charset="0"/>
+                <a:sym typeface="Marlett" pitchFamily="2" charset="2"/>
+              </a:rPr>
+              <a:t>+ D</a:t>
+            </a:r>
+            <a:r>
+              <a:rPr lang="ja-JP" altLang="en-US" sz="1200" dirty="0">
+                <a:solidFill>
+                  <a:prstClr val="black">
+                    <a:lumMod val="75000"/>
+                    <a:lumOff val="25000"/>
+                  </a:prstClr>
+                </a:solidFill>
+                <a:latin typeface="メイリオ" panose="020B0604030504040204" pitchFamily="50" charset="-128"/>
+                <a:ea typeface="メイリオ" panose="020B0604030504040204" pitchFamily="50" charset="-128"/>
+                <a:cs typeface="Arial" pitchFamily="34" charset="0"/>
+              </a:rPr>
+              <a:t>」：</a:t>
+            </a:r>
+            <a:r>
+              <a:rPr lang="zh-TW" altLang="en-US" sz="1200" dirty="0">
+                <a:solidFill>
+                  <a:prstClr val="black">
+                    <a:lumMod val="75000"/>
+                    <a:lumOff val="25000"/>
+                  </a:prstClr>
+                </a:solidFill>
+                <a:latin typeface="メイリオ" panose="020B0604030504040204" pitchFamily="50" charset="-128"/>
+                <a:ea typeface="メイリオ" panose="020B0604030504040204" pitchFamily="50" charset="-128"/>
+                <a:cs typeface="Arial" pitchFamily="34" charset="0"/>
+              </a:rPr>
+              <a:t>回到桌面</a:t>
+            </a:r>
+            <a:r>
+              <a:rPr lang="en-US" altLang="zh-TW" sz="1200" dirty="0">
+                <a:solidFill>
+                  <a:prstClr val="black">
+                    <a:lumMod val="75000"/>
+                    <a:lumOff val="25000"/>
+                  </a:prstClr>
+                </a:solidFill>
+                <a:latin typeface="メイリオ" panose="020B0604030504040204" pitchFamily="50" charset="-128"/>
+                <a:ea typeface="メイリオ" panose="020B0604030504040204" pitchFamily="50" charset="-128"/>
+                <a:cs typeface="Arial" pitchFamily="34" charset="0"/>
+              </a:rPr>
+              <a:t>(</a:t>
+            </a:r>
+            <a:r>
+              <a:rPr lang="zh-TW" altLang="en-US" sz="1200" dirty="0">
+                <a:solidFill>
+                  <a:prstClr val="black">
+                    <a:lumMod val="75000"/>
+                    <a:lumOff val="25000"/>
+                  </a:prstClr>
+                </a:solidFill>
+                <a:latin typeface="メイリオ" panose="020B0604030504040204" pitchFamily="50" charset="-128"/>
+                <a:ea typeface="メイリオ" panose="020B0604030504040204" pitchFamily="50" charset="-128"/>
+                <a:cs typeface="Arial" pitchFamily="34" charset="0"/>
+              </a:rPr>
+              <a:t>其他程式最小化</a:t>
+            </a:r>
+            <a:r>
+              <a:rPr lang="en-US" altLang="zh-TW" sz="1200" dirty="0">
+                <a:solidFill>
+                  <a:prstClr val="black">
+                    <a:lumMod val="75000"/>
+                    <a:lumOff val="25000"/>
+                  </a:prstClr>
+                </a:solidFill>
+                <a:latin typeface="メイリオ" panose="020B0604030504040204" pitchFamily="50" charset="-128"/>
+                <a:ea typeface="メイリオ" panose="020B0604030504040204" pitchFamily="50" charset="-128"/>
+                <a:cs typeface="Arial" pitchFamily="34" charset="0"/>
+              </a:rPr>
+              <a:t>)</a:t>
+            </a:r>
+          </a:p>
+          <a:p>
+            <a:pPr marL="228600" indent="-228600">
+              <a:buFont typeface="Arial" panose="020B0604020202020204" pitchFamily="34" charset="0"/>
+              <a:buChar char="•"/>
+              <a:defRPr/>
+            </a:pPr>
+            <a:r>
+              <a:rPr lang="ja-JP" altLang="en-US" sz="1200" dirty="0">
+                <a:solidFill>
+                  <a:prstClr val="black">
+                    <a:lumMod val="75000"/>
+                    <a:lumOff val="25000"/>
+                  </a:prstClr>
+                </a:solidFill>
+                <a:latin typeface="メイリオ" panose="020B0604030504040204" pitchFamily="50" charset="-128"/>
+                <a:ea typeface="メイリオ" panose="020B0604030504040204" pitchFamily="50" charset="-128"/>
+                <a:cs typeface="Arial" pitchFamily="34" charset="0"/>
+              </a:rPr>
+              <a:t>「</a:t>
+            </a:r>
+            <a:r>
+              <a:rPr lang="ja-JP" altLang="en-US" sz="1200" dirty="0">
+                <a:solidFill>
+                  <a:prstClr val="black">
+                    <a:lumMod val="75000"/>
+                    <a:lumOff val="25000"/>
+                  </a:prstClr>
+                </a:solidFill>
+                <a:latin typeface="メイリオ" panose="020B0604030504040204" pitchFamily="50" charset="-128"/>
+                <a:ea typeface="メイリオ" panose="020B0604030504040204" pitchFamily="50" charset="-128"/>
+                <a:cs typeface="Arial" pitchFamily="34" charset="0"/>
+                <a:sym typeface="Marlett" pitchFamily="2" charset="2"/>
+              </a:rPr>
+              <a:t> </a:t>
+            </a:r>
+            <a:r>
+              <a:rPr lang="en-US" altLang="ja-JP" sz="1200" dirty="0">
+                <a:solidFill>
+                  <a:prstClr val="black">
+                    <a:lumMod val="75000"/>
+                    <a:lumOff val="25000"/>
+                  </a:prstClr>
+                </a:solidFill>
+                <a:latin typeface="メイリオ" panose="020B0604030504040204" pitchFamily="50" charset="-128"/>
+                <a:ea typeface="メイリオ" panose="020B0604030504040204" pitchFamily="50" charset="-128"/>
+                <a:cs typeface="Arial" pitchFamily="34" charset="0"/>
+                <a:sym typeface="Marlett" pitchFamily="2" charset="2"/>
+              </a:rPr>
+              <a:t>+ L</a:t>
+            </a:r>
+            <a:r>
+              <a:rPr lang="ja-JP" altLang="en-US" sz="1200" dirty="0">
+                <a:solidFill>
+                  <a:prstClr val="black">
+                    <a:lumMod val="75000"/>
+                    <a:lumOff val="25000"/>
+                  </a:prstClr>
+                </a:solidFill>
+                <a:latin typeface="メイリオ" panose="020B0604030504040204" pitchFamily="50" charset="-128"/>
+                <a:ea typeface="メイリオ" panose="020B0604030504040204" pitchFamily="50" charset="-128"/>
+                <a:cs typeface="Arial" pitchFamily="34" charset="0"/>
+              </a:rPr>
+              <a:t>」：</a:t>
+            </a:r>
+            <a:r>
+              <a:rPr lang="zh-TW" altLang="en-US" sz="1200" dirty="0">
+                <a:solidFill>
+                  <a:prstClr val="black">
+                    <a:lumMod val="75000"/>
+                    <a:lumOff val="25000"/>
+                  </a:prstClr>
+                </a:solidFill>
+                <a:latin typeface="メイリオ" panose="020B0604030504040204" pitchFamily="50" charset="-128"/>
+                <a:ea typeface="メイリオ" panose="020B0604030504040204" pitchFamily="50" charset="-128"/>
+                <a:cs typeface="Arial" pitchFamily="34" charset="0"/>
+              </a:rPr>
+              <a:t>畫面鎖定</a:t>
+            </a:r>
+            <a:r>
+              <a:rPr lang="en-US" altLang="zh-TW" sz="1200" dirty="0">
+                <a:solidFill>
+                  <a:prstClr val="black">
+                    <a:lumMod val="75000"/>
+                    <a:lumOff val="25000"/>
+                  </a:prstClr>
+                </a:solidFill>
+                <a:latin typeface="メイリオ" panose="020B0604030504040204" pitchFamily="50" charset="-128"/>
+                <a:ea typeface="メイリオ" panose="020B0604030504040204" pitchFamily="50" charset="-128"/>
+                <a:cs typeface="Arial" pitchFamily="34" charset="0"/>
+              </a:rPr>
+              <a:t>(</a:t>
+            </a:r>
+            <a:r>
+              <a:rPr lang="zh-TW" altLang="en-US" sz="1200" dirty="0">
+                <a:solidFill>
+                  <a:prstClr val="black">
+                    <a:lumMod val="75000"/>
+                    <a:lumOff val="25000"/>
+                  </a:prstClr>
+                </a:solidFill>
+                <a:latin typeface="メイリオ" panose="020B0604030504040204" pitchFamily="50" charset="-128"/>
+                <a:ea typeface="メイリオ" panose="020B0604030504040204" pitchFamily="50" charset="-128"/>
+                <a:cs typeface="Arial" pitchFamily="34" charset="0"/>
+              </a:rPr>
+              <a:t>需要再輸入密碼</a:t>
+            </a:r>
+            <a:r>
+              <a:rPr lang="en-US" altLang="zh-TW" sz="1200" dirty="0">
+                <a:solidFill>
+                  <a:prstClr val="black">
+                    <a:lumMod val="75000"/>
+                    <a:lumOff val="25000"/>
+                  </a:prstClr>
+                </a:solidFill>
+                <a:latin typeface="メイリオ" panose="020B0604030504040204" pitchFamily="50" charset="-128"/>
+                <a:ea typeface="メイリオ" panose="020B0604030504040204" pitchFamily="50" charset="-128"/>
+                <a:cs typeface="Arial" pitchFamily="34" charset="0"/>
+              </a:rPr>
+              <a:t>)</a:t>
+            </a:r>
+          </a:p>
+          <a:p>
+            <a:pPr marL="228600" indent="-228600">
+              <a:buFont typeface="Arial" panose="020B0604020202020204" pitchFamily="34" charset="0"/>
+              <a:buChar char="•"/>
+              <a:defRPr/>
+            </a:pPr>
+            <a:r>
+              <a:rPr lang="ja-JP" altLang="en-US" sz="1200" dirty="0">
+                <a:solidFill>
+                  <a:prstClr val="black">
+                    <a:lumMod val="75000"/>
+                    <a:lumOff val="25000"/>
+                  </a:prstClr>
+                </a:solidFill>
+                <a:latin typeface="メイリオ" panose="020B0604030504040204" pitchFamily="50" charset="-128"/>
+                <a:ea typeface="メイリオ" panose="020B0604030504040204" pitchFamily="50" charset="-128"/>
+                <a:cs typeface="Arial" pitchFamily="34" charset="0"/>
+              </a:rPr>
+              <a:t>「</a:t>
+            </a:r>
+            <a:r>
+              <a:rPr lang="ja-JP" altLang="en-US" sz="1200" dirty="0">
+                <a:solidFill>
+                  <a:prstClr val="black">
+                    <a:lumMod val="75000"/>
+                    <a:lumOff val="25000"/>
+                  </a:prstClr>
+                </a:solidFill>
+                <a:latin typeface="メイリオ" panose="020B0604030504040204" pitchFamily="50" charset="-128"/>
+                <a:ea typeface="メイリオ" panose="020B0604030504040204" pitchFamily="50" charset="-128"/>
+                <a:cs typeface="Arial" pitchFamily="34" charset="0"/>
+                <a:sym typeface="Marlett" pitchFamily="2" charset="2"/>
+              </a:rPr>
+              <a:t> </a:t>
+            </a:r>
+            <a:r>
+              <a:rPr lang="en-US" altLang="ja-JP" sz="1200" dirty="0">
+                <a:solidFill>
+                  <a:prstClr val="black">
+                    <a:lumMod val="75000"/>
+                    <a:lumOff val="25000"/>
+                  </a:prstClr>
+                </a:solidFill>
+                <a:latin typeface="メイリオ" panose="020B0604030504040204" pitchFamily="50" charset="-128"/>
+                <a:ea typeface="メイリオ" panose="020B0604030504040204" pitchFamily="50" charset="-128"/>
+                <a:cs typeface="Arial" pitchFamily="34" charset="0"/>
+                <a:sym typeface="Marlett" pitchFamily="2" charset="2"/>
+              </a:rPr>
+              <a:t>+ E</a:t>
+            </a:r>
+            <a:r>
+              <a:rPr lang="ja-JP" altLang="en-US" sz="1200" dirty="0">
+                <a:solidFill>
+                  <a:prstClr val="black">
+                    <a:lumMod val="75000"/>
+                    <a:lumOff val="25000"/>
+                  </a:prstClr>
+                </a:solidFill>
+                <a:latin typeface="メイリオ" panose="020B0604030504040204" pitchFamily="50" charset="-128"/>
+                <a:ea typeface="メイリオ" panose="020B0604030504040204" pitchFamily="50" charset="-128"/>
+                <a:cs typeface="Arial" pitchFamily="34" charset="0"/>
+              </a:rPr>
+              <a:t>」：</a:t>
+            </a:r>
+            <a:r>
+              <a:rPr lang="zh-TW" altLang="en-US" sz="1200" dirty="0">
+                <a:solidFill>
+                  <a:prstClr val="black">
+                    <a:lumMod val="75000"/>
+                    <a:lumOff val="25000"/>
+                  </a:prstClr>
+                </a:solidFill>
+                <a:latin typeface="メイリオ" panose="020B0604030504040204" pitchFamily="50" charset="-128"/>
+                <a:ea typeface="メイリオ" panose="020B0604030504040204" pitchFamily="50" charset="-128"/>
+                <a:cs typeface="Arial" pitchFamily="34" charset="0"/>
+              </a:rPr>
+              <a:t>開啟</a:t>
+            </a:r>
+            <a:r>
+              <a:rPr lang="en-US" altLang="zh-TW" sz="1200" dirty="0">
+                <a:solidFill>
+                  <a:prstClr val="black">
+                    <a:lumMod val="75000"/>
+                    <a:lumOff val="25000"/>
+                  </a:prstClr>
+                </a:solidFill>
+                <a:latin typeface="メイリオ" panose="020B0604030504040204" pitchFamily="50" charset="-128"/>
+                <a:ea typeface="メイリオ" panose="020B0604030504040204" pitchFamily="50" charset="-128"/>
+                <a:cs typeface="Arial" pitchFamily="34" charset="0"/>
+              </a:rPr>
+              <a:t>Explorer(</a:t>
+            </a:r>
+            <a:r>
+              <a:rPr lang="zh-TW" altLang="en-US" sz="1200" dirty="0">
+                <a:solidFill>
+                  <a:prstClr val="black">
+                    <a:lumMod val="75000"/>
+                    <a:lumOff val="25000"/>
+                  </a:prstClr>
+                </a:solidFill>
+                <a:latin typeface="メイリオ" panose="020B0604030504040204" pitchFamily="50" charset="-128"/>
+                <a:ea typeface="メイリオ" panose="020B0604030504040204" pitchFamily="50" charset="-128"/>
+                <a:cs typeface="Arial" pitchFamily="34" charset="0"/>
+              </a:rPr>
+              <a:t>資料夾</a:t>
+            </a:r>
+            <a:r>
+              <a:rPr lang="en-US" altLang="zh-TW" sz="1200" dirty="0">
+                <a:solidFill>
+                  <a:prstClr val="black">
+                    <a:lumMod val="75000"/>
+                    <a:lumOff val="25000"/>
+                  </a:prstClr>
+                </a:solidFill>
+                <a:latin typeface="メイリオ" panose="020B0604030504040204" pitchFamily="50" charset="-128"/>
+                <a:ea typeface="メイリオ" panose="020B0604030504040204" pitchFamily="50" charset="-128"/>
+                <a:cs typeface="Arial" pitchFamily="34" charset="0"/>
+              </a:rPr>
+              <a:t>)</a:t>
+            </a:r>
+          </a:p>
+          <a:p>
+            <a:pPr marL="228600" indent="-228600">
+              <a:buFont typeface="Arial" panose="020B0604020202020204" pitchFamily="34" charset="0"/>
+              <a:buChar char="•"/>
+              <a:defRPr/>
+            </a:pPr>
+            <a:r>
+              <a:rPr lang="ja-JP" altLang="en-US" sz="1200" dirty="0">
+                <a:solidFill>
+                  <a:prstClr val="black">
+                    <a:lumMod val="75000"/>
+                    <a:lumOff val="25000"/>
+                  </a:prstClr>
+                </a:solidFill>
+                <a:latin typeface="メイリオ" panose="020B0604030504040204" pitchFamily="50" charset="-128"/>
+                <a:ea typeface="メイリオ" panose="020B0604030504040204" pitchFamily="50" charset="-128"/>
+                <a:cs typeface="Arial" pitchFamily="34" charset="0"/>
+              </a:rPr>
+              <a:t>「</a:t>
+            </a:r>
+            <a:r>
+              <a:rPr lang="ja-JP" altLang="en-US" sz="1200" dirty="0">
+                <a:solidFill>
+                  <a:prstClr val="black">
+                    <a:lumMod val="75000"/>
+                    <a:lumOff val="25000"/>
+                  </a:prstClr>
+                </a:solidFill>
+                <a:latin typeface="メイリオ" panose="020B0604030504040204" pitchFamily="50" charset="-128"/>
+                <a:ea typeface="メイリオ" panose="020B0604030504040204" pitchFamily="50" charset="-128"/>
+                <a:cs typeface="Arial" pitchFamily="34" charset="0"/>
+                <a:sym typeface="Marlett" pitchFamily="2" charset="2"/>
+              </a:rPr>
+              <a:t> </a:t>
+            </a:r>
+            <a:r>
+              <a:rPr lang="en-US" altLang="ja-JP" sz="1200" dirty="0">
+                <a:solidFill>
+                  <a:prstClr val="black">
+                    <a:lumMod val="75000"/>
+                    <a:lumOff val="25000"/>
+                  </a:prstClr>
+                </a:solidFill>
+                <a:latin typeface="メイリオ" panose="020B0604030504040204" pitchFamily="50" charset="-128"/>
+                <a:ea typeface="メイリオ" panose="020B0604030504040204" pitchFamily="50" charset="-128"/>
+                <a:cs typeface="Arial" pitchFamily="34" charset="0"/>
+                <a:sym typeface="Marlett" pitchFamily="2" charset="2"/>
+              </a:rPr>
+              <a:t>+ </a:t>
+            </a:r>
+            <a:r>
+              <a:rPr lang="ja-JP" altLang="en-US" sz="1200" dirty="0">
+                <a:solidFill>
+                  <a:prstClr val="black">
+                    <a:lumMod val="75000"/>
+                    <a:lumOff val="25000"/>
+                  </a:prstClr>
+                </a:solidFill>
+                <a:latin typeface="メイリオ" panose="020B0604030504040204" pitchFamily="50" charset="-128"/>
+                <a:ea typeface="メイリオ" panose="020B0604030504040204" pitchFamily="50" charset="-128"/>
+                <a:cs typeface="Arial" pitchFamily="34" charset="0"/>
+                <a:sym typeface="Marlett" pitchFamily="2" charset="2"/>
+              </a:rPr>
+              <a:t>←</a:t>
+            </a:r>
+            <a:r>
+              <a:rPr lang="ja-JP" altLang="en-US" sz="1200" dirty="0">
+                <a:solidFill>
+                  <a:prstClr val="black">
+                    <a:lumMod val="75000"/>
+                    <a:lumOff val="25000"/>
+                  </a:prstClr>
+                </a:solidFill>
+                <a:latin typeface="メイリオ" panose="020B0604030504040204" pitchFamily="50" charset="-128"/>
+                <a:ea typeface="メイリオ" panose="020B0604030504040204" pitchFamily="50" charset="-128"/>
+                <a:cs typeface="Arial" pitchFamily="34" charset="0"/>
+              </a:rPr>
+              <a:t>」：</a:t>
+            </a:r>
+            <a:r>
+              <a:rPr lang="zh-TW" altLang="en-US" sz="1200" dirty="0">
+                <a:solidFill>
+                  <a:prstClr val="black">
+                    <a:lumMod val="75000"/>
+                    <a:lumOff val="25000"/>
+                  </a:prstClr>
+                </a:solidFill>
+                <a:latin typeface="メイリオ" panose="020B0604030504040204" pitchFamily="50" charset="-128"/>
+                <a:ea typeface="メイリオ" panose="020B0604030504040204" pitchFamily="50" charset="-128"/>
+                <a:cs typeface="Arial" pitchFamily="34" charset="0"/>
+              </a:rPr>
+              <a:t>將現在開啟的程式固定到螢幕左半邊</a:t>
+            </a:r>
+            <a:endParaRPr lang="en-US" altLang="zh-TW" sz="1200" dirty="0">
+              <a:solidFill>
+                <a:prstClr val="black">
+                  <a:lumMod val="75000"/>
+                  <a:lumOff val="25000"/>
+                </a:prstClr>
+              </a:solidFill>
+              <a:latin typeface="メイリオ" panose="020B0604030504040204" pitchFamily="50" charset="-128"/>
+              <a:ea typeface="メイリオ" panose="020B0604030504040204" pitchFamily="50" charset="-128"/>
+              <a:cs typeface="Arial" pitchFamily="34" charset="0"/>
+            </a:endParaRPr>
+          </a:p>
+          <a:p>
+            <a:pPr marL="228600" indent="-228600">
+              <a:buFont typeface="Arial" panose="020B0604020202020204" pitchFamily="34" charset="0"/>
+              <a:buChar char="•"/>
+              <a:defRPr/>
+            </a:pPr>
+            <a:r>
+              <a:rPr lang="ja-JP" altLang="en-US" sz="1200" dirty="0">
+                <a:solidFill>
+                  <a:prstClr val="black">
+                    <a:lumMod val="75000"/>
+                    <a:lumOff val="25000"/>
+                  </a:prstClr>
+                </a:solidFill>
+                <a:latin typeface="メイリオ" panose="020B0604030504040204" pitchFamily="50" charset="-128"/>
+                <a:ea typeface="メイリオ" panose="020B0604030504040204" pitchFamily="50" charset="-128"/>
+                <a:cs typeface="Arial" pitchFamily="34" charset="0"/>
+              </a:rPr>
+              <a:t>「</a:t>
+            </a:r>
+            <a:r>
+              <a:rPr lang="ja-JP" altLang="en-US" sz="1200" dirty="0">
+                <a:solidFill>
+                  <a:prstClr val="black">
+                    <a:lumMod val="75000"/>
+                    <a:lumOff val="25000"/>
+                  </a:prstClr>
+                </a:solidFill>
+                <a:latin typeface="メイリオ" panose="020B0604030504040204" pitchFamily="50" charset="-128"/>
+                <a:ea typeface="メイリオ" panose="020B0604030504040204" pitchFamily="50" charset="-128"/>
+                <a:cs typeface="Arial" pitchFamily="34" charset="0"/>
+                <a:sym typeface="Marlett" pitchFamily="2" charset="2"/>
+              </a:rPr>
+              <a:t> </a:t>
+            </a:r>
+            <a:r>
+              <a:rPr lang="en-US" altLang="ja-JP" sz="1200" dirty="0">
+                <a:solidFill>
+                  <a:prstClr val="black">
+                    <a:lumMod val="75000"/>
+                    <a:lumOff val="25000"/>
+                  </a:prstClr>
+                </a:solidFill>
+                <a:latin typeface="メイリオ" panose="020B0604030504040204" pitchFamily="50" charset="-128"/>
+                <a:ea typeface="メイリオ" panose="020B0604030504040204" pitchFamily="50" charset="-128"/>
+                <a:cs typeface="Arial" pitchFamily="34" charset="0"/>
+                <a:sym typeface="Marlett" pitchFamily="2" charset="2"/>
+              </a:rPr>
+              <a:t>+ </a:t>
+            </a:r>
+            <a:r>
+              <a:rPr lang="ja-JP" altLang="en-US" sz="1200" dirty="0">
+                <a:solidFill>
+                  <a:prstClr val="black">
+                    <a:lumMod val="75000"/>
+                    <a:lumOff val="25000"/>
+                  </a:prstClr>
+                </a:solidFill>
+                <a:latin typeface="メイリオ" panose="020B0604030504040204" pitchFamily="50" charset="-128"/>
+                <a:ea typeface="メイリオ" panose="020B0604030504040204" pitchFamily="50" charset="-128"/>
+                <a:cs typeface="Arial" pitchFamily="34" charset="0"/>
+                <a:sym typeface="Marlett" pitchFamily="2" charset="2"/>
+              </a:rPr>
+              <a:t>→</a:t>
+            </a:r>
+            <a:r>
+              <a:rPr lang="ja-JP" altLang="en-US" sz="1200" dirty="0">
+                <a:solidFill>
+                  <a:prstClr val="black">
+                    <a:lumMod val="75000"/>
+                    <a:lumOff val="25000"/>
+                  </a:prstClr>
+                </a:solidFill>
+                <a:latin typeface="メイリオ" panose="020B0604030504040204" pitchFamily="50" charset="-128"/>
+                <a:ea typeface="メイリオ" panose="020B0604030504040204" pitchFamily="50" charset="-128"/>
+                <a:cs typeface="Arial" pitchFamily="34" charset="0"/>
+              </a:rPr>
+              <a:t>」：</a:t>
+            </a:r>
+            <a:r>
+              <a:rPr lang="zh-TW" altLang="en-US" sz="1200" dirty="0">
+                <a:solidFill>
+                  <a:prstClr val="black">
+                    <a:lumMod val="75000"/>
+                    <a:lumOff val="25000"/>
+                  </a:prstClr>
+                </a:solidFill>
+                <a:latin typeface="メイリオ" panose="020B0604030504040204" pitchFamily="50" charset="-128"/>
+                <a:ea typeface="メイリオ" panose="020B0604030504040204" pitchFamily="50" charset="-128"/>
+                <a:cs typeface="Arial" pitchFamily="34" charset="0"/>
+              </a:rPr>
+              <a:t>將現在開啟的程式固定到螢幕右半邊</a:t>
+            </a:r>
+            <a:endParaRPr lang="en-US" altLang="zh-TW" sz="1200" dirty="0">
+              <a:solidFill>
+                <a:prstClr val="black">
+                  <a:lumMod val="75000"/>
+                  <a:lumOff val="25000"/>
+                </a:prstClr>
+              </a:solidFill>
+              <a:latin typeface="メイリオ" panose="020B0604030504040204" pitchFamily="50" charset="-128"/>
+              <a:ea typeface="メイリオ" panose="020B0604030504040204" pitchFamily="50" charset="-128"/>
+              <a:cs typeface="Arial" pitchFamily="34" charset="0"/>
+            </a:endParaRPr>
+          </a:p>
+          <a:p>
+            <a:pPr marL="228600" indent="-228600">
+              <a:buFont typeface="Arial" panose="020B0604020202020204" pitchFamily="34" charset="0"/>
+              <a:buChar char="•"/>
+              <a:defRPr/>
+            </a:pPr>
+            <a:r>
+              <a:rPr lang="ja-JP" altLang="en-US" sz="1200" dirty="0">
+                <a:solidFill>
+                  <a:prstClr val="black">
+                    <a:lumMod val="75000"/>
+                    <a:lumOff val="25000"/>
+                  </a:prstClr>
+                </a:solidFill>
+                <a:latin typeface="メイリオ" panose="020B0604030504040204" pitchFamily="50" charset="-128"/>
+                <a:ea typeface="メイリオ" panose="020B0604030504040204" pitchFamily="50" charset="-128"/>
+                <a:cs typeface="Arial" pitchFamily="34" charset="0"/>
+              </a:rPr>
+              <a:t>「</a:t>
+            </a:r>
+            <a:r>
+              <a:rPr lang="ja-JP" altLang="en-US" sz="1200" dirty="0">
+                <a:solidFill>
+                  <a:prstClr val="black">
+                    <a:lumMod val="75000"/>
+                    <a:lumOff val="25000"/>
+                  </a:prstClr>
+                </a:solidFill>
+                <a:latin typeface="メイリオ" panose="020B0604030504040204" pitchFamily="50" charset="-128"/>
+                <a:ea typeface="メイリオ" panose="020B0604030504040204" pitchFamily="50" charset="-128"/>
+                <a:cs typeface="Arial" pitchFamily="34" charset="0"/>
+                <a:sym typeface="Marlett" pitchFamily="2" charset="2"/>
+              </a:rPr>
+              <a:t> </a:t>
+            </a:r>
+            <a:r>
+              <a:rPr lang="en-US" altLang="ja-JP" sz="1200" dirty="0">
+                <a:solidFill>
+                  <a:prstClr val="black">
+                    <a:lumMod val="75000"/>
+                    <a:lumOff val="25000"/>
+                  </a:prstClr>
+                </a:solidFill>
+                <a:latin typeface="メイリオ" panose="020B0604030504040204" pitchFamily="50" charset="-128"/>
+                <a:ea typeface="メイリオ" panose="020B0604030504040204" pitchFamily="50" charset="-128"/>
+                <a:cs typeface="Arial" pitchFamily="34" charset="0"/>
+                <a:sym typeface="Marlett" pitchFamily="2" charset="2"/>
+              </a:rPr>
+              <a:t>+ </a:t>
+            </a:r>
+            <a:r>
+              <a:rPr lang="ja-JP" altLang="en-US" sz="1200" dirty="0">
+                <a:solidFill>
+                  <a:prstClr val="black">
+                    <a:lumMod val="75000"/>
+                    <a:lumOff val="25000"/>
+                  </a:prstClr>
+                </a:solidFill>
+                <a:latin typeface="メイリオ" panose="020B0604030504040204" pitchFamily="50" charset="-128"/>
+                <a:ea typeface="メイリオ" panose="020B0604030504040204" pitchFamily="50" charset="-128"/>
+                <a:cs typeface="Arial" pitchFamily="34" charset="0"/>
+                <a:sym typeface="Marlett" pitchFamily="2" charset="2"/>
+              </a:rPr>
+              <a:t>↑</a:t>
+            </a:r>
+            <a:r>
+              <a:rPr lang="ja-JP" altLang="en-US" sz="1200" dirty="0">
+                <a:solidFill>
+                  <a:prstClr val="black">
+                    <a:lumMod val="75000"/>
+                    <a:lumOff val="25000"/>
+                  </a:prstClr>
+                </a:solidFill>
+                <a:latin typeface="メイリオ" panose="020B0604030504040204" pitchFamily="50" charset="-128"/>
+                <a:ea typeface="メイリオ" panose="020B0604030504040204" pitchFamily="50" charset="-128"/>
+                <a:cs typeface="Arial" pitchFamily="34" charset="0"/>
+              </a:rPr>
+              <a:t>」：</a:t>
+            </a:r>
+            <a:r>
+              <a:rPr lang="zh-TW" altLang="en-US" sz="1200" dirty="0">
+                <a:solidFill>
+                  <a:prstClr val="black">
+                    <a:lumMod val="75000"/>
+                    <a:lumOff val="25000"/>
+                  </a:prstClr>
+                </a:solidFill>
+                <a:latin typeface="メイリオ" panose="020B0604030504040204" pitchFamily="50" charset="-128"/>
+                <a:ea typeface="メイリオ" panose="020B0604030504040204" pitchFamily="50" charset="-128"/>
+                <a:cs typeface="Arial" pitchFamily="34" charset="0"/>
+              </a:rPr>
+              <a:t>將現在開啟的程式最大化</a:t>
+            </a:r>
+            <a:endParaRPr lang="en-US" altLang="zh-TW" sz="1200" dirty="0">
+              <a:solidFill>
+                <a:prstClr val="black">
+                  <a:lumMod val="75000"/>
+                  <a:lumOff val="25000"/>
+                </a:prstClr>
+              </a:solidFill>
+              <a:latin typeface="メイリオ" panose="020B0604030504040204" pitchFamily="50" charset="-128"/>
+              <a:ea typeface="メイリオ" panose="020B0604030504040204" pitchFamily="50" charset="-128"/>
+              <a:cs typeface="Arial" pitchFamily="34" charset="0"/>
+            </a:endParaRPr>
+          </a:p>
+          <a:p>
+            <a:pPr marL="228600" indent="-228600">
+              <a:buFont typeface="Arial" panose="020B0604020202020204" pitchFamily="34" charset="0"/>
+              <a:buChar char="•"/>
+              <a:defRPr/>
+            </a:pPr>
+            <a:r>
+              <a:rPr lang="ja-JP" altLang="en-US" sz="1200" dirty="0">
+                <a:solidFill>
+                  <a:prstClr val="black">
+                    <a:lumMod val="75000"/>
+                    <a:lumOff val="25000"/>
+                  </a:prstClr>
+                </a:solidFill>
+                <a:latin typeface="メイリオ" panose="020B0604030504040204" pitchFamily="50" charset="-128"/>
+                <a:ea typeface="メイリオ" panose="020B0604030504040204" pitchFamily="50" charset="-128"/>
+                <a:cs typeface="Arial" pitchFamily="34" charset="0"/>
+              </a:rPr>
+              <a:t>「</a:t>
+            </a:r>
+            <a:r>
+              <a:rPr lang="ja-JP" altLang="en-US" sz="1200" dirty="0">
+                <a:solidFill>
+                  <a:prstClr val="black">
+                    <a:lumMod val="75000"/>
+                    <a:lumOff val="25000"/>
+                  </a:prstClr>
+                </a:solidFill>
+                <a:latin typeface="メイリオ" panose="020B0604030504040204" pitchFamily="50" charset="-128"/>
+                <a:ea typeface="メイリオ" panose="020B0604030504040204" pitchFamily="50" charset="-128"/>
+                <a:cs typeface="Arial" pitchFamily="34" charset="0"/>
+                <a:sym typeface="Marlett" pitchFamily="2" charset="2"/>
+              </a:rPr>
+              <a:t> </a:t>
+            </a:r>
+            <a:r>
+              <a:rPr lang="en-US" altLang="ja-JP" sz="1200" dirty="0">
+                <a:solidFill>
+                  <a:prstClr val="black">
+                    <a:lumMod val="75000"/>
+                    <a:lumOff val="25000"/>
+                  </a:prstClr>
+                </a:solidFill>
+                <a:latin typeface="メイリオ" panose="020B0604030504040204" pitchFamily="50" charset="-128"/>
+                <a:ea typeface="メイリオ" panose="020B0604030504040204" pitchFamily="50" charset="-128"/>
+                <a:cs typeface="Arial" pitchFamily="34" charset="0"/>
+                <a:sym typeface="Marlett" pitchFamily="2" charset="2"/>
+              </a:rPr>
+              <a:t>+ </a:t>
+            </a:r>
+            <a:r>
+              <a:rPr lang="ja-JP" altLang="en-US" sz="1200" dirty="0">
+                <a:solidFill>
+                  <a:prstClr val="black">
+                    <a:lumMod val="75000"/>
+                    <a:lumOff val="25000"/>
+                  </a:prstClr>
+                </a:solidFill>
+                <a:latin typeface="メイリオ" panose="020B0604030504040204" pitchFamily="50" charset="-128"/>
+                <a:ea typeface="メイリオ" panose="020B0604030504040204" pitchFamily="50" charset="-128"/>
+                <a:cs typeface="Arial" pitchFamily="34" charset="0"/>
+                <a:sym typeface="Marlett" pitchFamily="2" charset="2"/>
+              </a:rPr>
+              <a:t>↓</a:t>
+            </a:r>
+            <a:r>
+              <a:rPr lang="ja-JP" altLang="en-US" sz="1200" dirty="0">
+                <a:solidFill>
+                  <a:prstClr val="black">
+                    <a:lumMod val="75000"/>
+                    <a:lumOff val="25000"/>
+                  </a:prstClr>
+                </a:solidFill>
+                <a:latin typeface="メイリオ" panose="020B0604030504040204" pitchFamily="50" charset="-128"/>
+                <a:ea typeface="メイリオ" panose="020B0604030504040204" pitchFamily="50" charset="-128"/>
+                <a:cs typeface="Arial" pitchFamily="34" charset="0"/>
+              </a:rPr>
+              <a:t>」：</a:t>
+            </a:r>
+            <a:r>
+              <a:rPr lang="zh-TW" altLang="en-US" sz="1200" dirty="0">
+                <a:solidFill>
+                  <a:prstClr val="black">
+                    <a:lumMod val="75000"/>
+                    <a:lumOff val="25000"/>
+                  </a:prstClr>
+                </a:solidFill>
+                <a:latin typeface="メイリオ" panose="020B0604030504040204" pitchFamily="50" charset="-128"/>
+                <a:ea typeface="メイリオ" panose="020B0604030504040204" pitchFamily="50" charset="-128"/>
+                <a:cs typeface="Arial" pitchFamily="34" charset="0"/>
+              </a:rPr>
+              <a:t>將現在開啟的程式最小化</a:t>
+            </a:r>
+            <a:endParaRPr lang="en-US" altLang="zh-TW" sz="1200" dirty="0">
+              <a:solidFill>
+                <a:prstClr val="black">
+                  <a:lumMod val="75000"/>
+                  <a:lumOff val="25000"/>
+                </a:prstClr>
+              </a:solidFill>
+              <a:latin typeface="メイリオ" panose="020B0604030504040204" pitchFamily="50" charset="-128"/>
+              <a:ea typeface="メイリオ" panose="020B0604030504040204" pitchFamily="50" charset="-128"/>
+              <a:cs typeface="Arial" pitchFamily="34" charset="0"/>
+            </a:endParaRPr>
+          </a:p>
+          <a:p>
+            <a:pPr marL="228600" indent="-228600">
+              <a:buFont typeface="Arial" panose="020B0604020202020204" pitchFamily="34" charset="0"/>
+              <a:buChar char="•"/>
+              <a:defRPr/>
+            </a:pPr>
+            <a:endParaRPr lang="en-US" altLang="zh-TW" sz="1200" dirty="0">
+              <a:solidFill>
+                <a:prstClr val="black">
+                  <a:lumMod val="75000"/>
+                  <a:lumOff val="25000"/>
+                </a:prstClr>
+              </a:solidFill>
+              <a:latin typeface="メイリオ" panose="020B0604030504040204" pitchFamily="50" charset="-128"/>
+              <a:ea typeface="メイリオ" panose="020B0604030504040204" pitchFamily="50" charset="-128"/>
+              <a:cs typeface="Arial" pitchFamily="34" charset="0"/>
+            </a:endParaRPr>
+          </a:p>
+          <a:p>
+            <a:pPr marL="228600" indent="-228600">
+              <a:buFont typeface="Arial" panose="020B0604020202020204" pitchFamily="34" charset="0"/>
+              <a:buChar char="•"/>
+              <a:defRPr/>
+            </a:pPr>
+            <a:endParaRPr lang="en-US" altLang="zh-TW" sz="1200" dirty="0">
+              <a:solidFill>
+                <a:prstClr val="black">
+                  <a:lumMod val="75000"/>
+                  <a:lumOff val="25000"/>
+                </a:prstClr>
+              </a:solidFill>
+              <a:latin typeface="メイリオ" panose="020B0604030504040204" pitchFamily="50" charset="-128"/>
+              <a:ea typeface="メイリオ" panose="020B0604030504040204" pitchFamily="50" charset="-128"/>
+              <a:cs typeface="Arial" pitchFamily="34" charset="0"/>
+            </a:endParaRPr>
+          </a:p>
+        </p:txBody>
+      </p:sp>
+      <p:sp>
+        <p:nvSpPr>
+          <p:cNvPr id="17" name="Text Placeholder 1">
+            <a:extLst>
+              <a:ext uri="{FF2B5EF4-FFF2-40B4-BE49-F238E27FC236}">
+                <a16:creationId xmlns:a16="http://schemas.microsoft.com/office/drawing/2014/main" id="{CC4019E9-2CF7-49D8-9EF7-F9A52ECF1208}"/>
+              </a:ext>
+            </a:extLst>
+          </p:cNvPr>
+          <p:cNvSpPr>
+            <a:spLocks noGrp="1"/>
+          </p:cNvSpPr>
+          <p:nvPr>
+            <p:ph type="body" sz="quarter" idx="10"/>
+          </p:nvPr>
+        </p:nvSpPr>
+        <p:spPr>
+          <a:xfrm>
+            <a:off x="323529" y="339509"/>
+            <a:ext cx="11573197" cy="724247"/>
+          </a:xfrm>
+        </p:spPr>
+        <p:txBody>
+          <a:bodyPr>
+            <a:normAutofit fontScale="85000" lnSpcReduction="20000"/>
+          </a:bodyPr>
+          <a:lstStyle/>
+          <a:p>
+            <a:r>
+              <a:rPr lang="en-US" dirty="0">
+                <a:latin typeface="メイリオ" panose="020B0604030504040204" pitchFamily="50" charset="-128"/>
+                <a:ea typeface="メイリオ" panose="020B0604030504040204" pitchFamily="50" charset="-128"/>
+              </a:rPr>
+              <a:t>Visual Studio Code</a:t>
+            </a:r>
+          </a:p>
+        </p:txBody>
+      </p:sp>
+      <p:pic>
+        <p:nvPicPr>
+          <p:cNvPr id="18" name="図 17">
+            <a:extLst>
+              <a:ext uri="{FF2B5EF4-FFF2-40B4-BE49-F238E27FC236}">
+                <a16:creationId xmlns:a16="http://schemas.microsoft.com/office/drawing/2014/main" id="{273FE85A-3F16-4E47-8BAE-F334787BED69}"/>
+              </a:ext>
+            </a:extLst>
+          </p:cNvPr>
+          <p:cNvPicPr>
+            <a:picLocks noChangeAspect="1"/>
+          </p:cNvPicPr>
+          <p:nvPr/>
+        </p:nvPicPr>
+        <p:blipFill>
+          <a:blip r:embed="rId2" cstate="print">
+            <a:extLst>
+              <a:ext uri="{28A0092B-C50C-407E-A947-70E740481C1C}">
+                <a14:useLocalDpi xmlns:a14="http://schemas.microsoft.com/office/drawing/2010/main" val="0"/>
+              </a:ext>
+            </a:extLst>
+          </a:blip>
+          <a:stretch>
+            <a:fillRect/>
+          </a:stretch>
+        </p:blipFill>
+        <p:spPr>
+          <a:xfrm>
+            <a:off x="9408608" y="169512"/>
+            <a:ext cx="845100" cy="852925"/>
+          </a:xfrm>
+          <a:prstGeom prst="rect">
+            <a:avLst/>
+          </a:prstGeom>
+        </p:spPr>
+      </p:pic>
+    </p:spTree>
+    <p:extLst>
+      <p:ext uri="{BB962C8B-B14F-4D97-AF65-F5344CB8AC3E}">
+        <p14:creationId xmlns:p14="http://schemas.microsoft.com/office/powerpoint/2010/main" val="312495722"/>
       </p:ext>
     </p:extLst>
   </p:cSld>

</xml_diff>